<commit_message>
minor tweaks to intro slides
</commit_message>
<xml_diff>
--- a/ClassMaterials/JavaIntro/Slides/InstructorIntro.pptx
+++ b/ClassMaterials/JavaIntro/Slides/InstructorIntro.pptx
@@ -219,7 +219,7 @@
           <a:p>
             <a:fld id="{A8CD1F60-86AF-274C-B759-04AFDD96F2D3}" type="datetimeFigureOut">
               <a:rPr lang="en-US" smtClean="0"/>
-              <a:t>3/9/2022</a:t>
+              <a:t>11/27/2022</a:t>
             </a:fld>
             <a:endParaRPr lang="en-US"/>
           </a:p>
@@ -1479,7 +1479,7 @@
           <a:p>
             <a:fld id="{1558ECB0-78E8-2947-93F5-766FFF283DA8}" type="datetimeFigureOut">
               <a:rPr lang="en-US" smtClean="0"/>
-              <a:t>3/9/2022</a:t>
+              <a:t>11/27/2022</a:t>
             </a:fld>
             <a:endParaRPr lang="en-US"/>
           </a:p>
@@ -1677,7 +1677,7 @@
           <a:p>
             <a:fld id="{1558ECB0-78E8-2947-93F5-766FFF283DA8}" type="datetimeFigureOut">
               <a:rPr lang="en-US" smtClean="0"/>
-              <a:t>3/9/2022</a:t>
+              <a:t>11/27/2022</a:t>
             </a:fld>
             <a:endParaRPr lang="en-US"/>
           </a:p>
@@ -1885,7 +1885,7 @@
           <a:p>
             <a:fld id="{1558ECB0-78E8-2947-93F5-766FFF283DA8}" type="datetimeFigureOut">
               <a:rPr lang="en-US" smtClean="0"/>
-              <a:t>3/9/2022</a:t>
+              <a:t>11/27/2022</a:t>
             </a:fld>
             <a:endParaRPr lang="en-US"/>
           </a:p>
@@ -2083,7 +2083,7 @@
           <a:p>
             <a:fld id="{1558ECB0-78E8-2947-93F5-766FFF283DA8}" type="datetimeFigureOut">
               <a:rPr lang="en-US" smtClean="0"/>
-              <a:t>3/9/2022</a:t>
+              <a:t>11/27/2022</a:t>
             </a:fld>
             <a:endParaRPr lang="en-US"/>
           </a:p>
@@ -2358,7 +2358,7 @@
           <a:p>
             <a:fld id="{1558ECB0-78E8-2947-93F5-766FFF283DA8}" type="datetimeFigureOut">
               <a:rPr lang="en-US" smtClean="0"/>
-              <a:t>3/9/2022</a:t>
+              <a:t>11/27/2022</a:t>
             </a:fld>
             <a:endParaRPr lang="en-US"/>
           </a:p>
@@ -2623,7 +2623,7 @@
           <a:p>
             <a:fld id="{1558ECB0-78E8-2947-93F5-766FFF283DA8}" type="datetimeFigureOut">
               <a:rPr lang="en-US" smtClean="0"/>
-              <a:t>3/9/2022</a:t>
+              <a:t>11/27/2022</a:t>
             </a:fld>
             <a:endParaRPr lang="en-US"/>
           </a:p>
@@ -3035,7 +3035,7 @@
           <a:p>
             <a:fld id="{1558ECB0-78E8-2947-93F5-766FFF283DA8}" type="datetimeFigureOut">
               <a:rPr lang="en-US" smtClean="0"/>
-              <a:t>3/9/2022</a:t>
+              <a:t>11/27/2022</a:t>
             </a:fld>
             <a:endParaRPr lang="en-US"/>
           </a:p>
@@ -3176,7 +3176,7 @@
           <a:p>
             <a:fld id="{1558ECB0-78E8-2947-93F5-766FFF283DA8}" type="datetimeFigureOut">
               <a:rPr lang="en-US" smtClean="0"/>
-              <a:t>3/9/2022</a:t>
+              <a:t>11/27/2022</a:t>
             </a:fld>
             <a:endParaRPr lang="en-US"/>
           </a:p>
@@ -3289,7 +3289,7 @@
           <a:p>
             <a:fld id="{1558ECB0-78E8-2947-93F5-766FFF283DA8}" type="datetimeFigureOut">
               <a:rPr lang="en-US" smtClean="0"/>
-              <a:t>3/9/2022</a:t>
+              <a:t>11/27/2022</a:t>
             </a:fld>
             <a:endParaRPr lang="en-US"/>
           </a:p>
@@ -3600,7 +3600,7 @@
           <a:p>
             <a:fld id="{1558ECB0-78E8-2947-93F5-766FFF283DA8}" type="datetimeFigureOut">
               <a:rPr lang="en-US" smtClean="0"/>
-              <a:t>3/9/2022</a:t>
+              <a:t>11/27/2022</a:t>
             </a:fld>
             <a:endParaRPr lang="en-US"/>
           </a:p>
@@ -3888,7 +3888,7 @@
           <a:p>
             <a:fld id="{1558ECB0-78E8-2947-93F5-766FFF283DA8}" type="datetimeFigureOut">
               <a:rPr lang="en-US" smtClean="0"/>
-              <a:t>3/9/2022</a:t>
+              <a:t>11/27/2022</a:t>
             </a:fld>
             <a:endParaRPr lang="en-US"/>
           </a:p>
@@ -4129,7 +4129,7 @@
           <a:p>
             <a:fld id="{1558ECB0-78E8-2947-93F5-766FFF283DA8}" type="datetimeFigureOut">
               <a:rPr lang="en-US" smtClean="0"/>
-              <a:t>3/9/2022</a:t>
+              <a:t>11/27/2022</a:t>
             </a:fld>
             <a:endParaRPr lang="en-US"/>
           </a:p>
@@ -4765,6 +4765,51 @@
           </a:prstGeom>
         </p:spPr>
       </p:pic>
+      <p:sp>
+        <p:nvSpPr>
+          <p:cNvPr id="2" name="TextBox 1">
+            <a:extLst>
+              <a:ext uri="{FF2B5EF4-FFF2-40B4-BE49-F238E27FC236}">
+                <a16:creationId xmlns:a16="http://schemas.microsoft.com/office/drawing/2014/main" id="{29826FFB-88E1-2671-3232-3FA756FD33C1}"/>
+              </a:ext>
+            </a:extLst>
+          </p:cNvPr>
+          <p:cNvSpPr txBox="1"/>
+          <p:nvPr/>
+        </p:nvSpPr>
+        <p:spPr>
+          <a:xfrm>
+            <a:off x="7510509" y="5397623"/>
+            <a:ext cx="3684233" cy="923330"/>
+          </a:xfrm>
+          <a:prstGeom prst="rect">
+            <a:avLst/>
+          </a:prstGeom>
+          <a:noFill/>
+        </p:spPr>
+        <p:txBody>
+          <a:bodyPr wrap="square" rtlCol="0">
+            <a:spAutoFit/>
+          </a:bodyPr>
+          <a:lstStyle/>
+          <a:p>
+            <a:r>
+              <a:rPr lang="en-US" dirty="0"/>
+              <a:t>Today’s Attendance Password:</a:t>
+            </a:r>
+          </a:p>
+          <a:p>
+            <a:endParaRPr lang="en-US" dirty="0"/>
+          </a:p>
+          <a:p>
+            <a:r>
+              <a:rPr lang="en-US" b="1" dirty="0" err="1"/>
+              <a:t>firstday</a:t>
+            </a:r>
+            <a:endParaRPr lang="en-US" b="1" dirty="0"/>
+          </a:p>
+        </p:txBody>
+      </p:sp>
     </p:spTree>
     <p:extLst>
       <p:ext uri="{BB962C8B-B14F-4D97-AF65-F5344CB8AC3E}">
@@ -7875,14 +7920,14 @@
             <a:pPr lvl="2"/>
             <a:r>
               <a:rPr lang="en-US" dirty="0"/>
-              <a:t>Jason</a:t>
+              <a:t>Dr. Yoder</a:t>
             </a:r>
           </a:p>
           <a:p>
             <a:pPr lvl="2"/>
             <a:r>
               <a:rPr lang="en-US" dirty="0"/>
-              <a:t>Dr. Yoder</a:t>
+              <a:t>Jason (if you prefer first name)</a:t>
             </a:r>
           </a:p>
           <a:p>
@@ -7903,7 +7948,7 @@
             <a:pPr lvl="1"/>
             <a:r>
               <a:rPr lang="en-US" dirty="0"/>
-              <a:t>Only on campus Mon-Thu</a:t>
+              <a:t>Only on campus Mon, Tue, Thu (normally)</a:t>
             </a:r>
           </a:p>
           <a:p>
@@ -8033,14 +8078,7 @@
             <a:pPr lvl="2"/>
             <a:r>
               <a:rPr lang="en-US" dirty="0"/>
-              <a:t>Fridays: Teams</a:t>
-            </a:r>
-          </a:p>
-          <a:p>
-            <a:pPr lvl="1"/>
-            <a:r>
-              <a:rPr lang="en-US" dirty="0"/>
-              <a:t>Since class meets at end of the day, some days I can stay late (not always, almost never on Thursdays)</a:t>
+              <a:t>Wednesdays/Fridays: Teams</a:t>
             </a:r>
           </a:p>
         </p:txBody>
@@ -8283,46 +8321,48 @@
         </p:nvSpPr>
         <p:spPr>
           <a:xfrm>
-            <a:off x="1981200" y="1600200"/>
+            <a:off x="1634971" y="1675152"/>
             <a:ext cx="8229600" cy="2819400"/>
           </a:xfrm>
         </p:spPr>
         <p:txBody>
-          <a:bodyPr/>
-          <a:lstStyle/>
-          <a:p>
-            <a:r>
-              <a:rPr lang="en-US" dirty="0"/>
+          <a:bodyPr>
+            <a:normAutofit/>
+          </a:bodyPr>
+          <a:lstStyle/>
+          <a:p>
+            <a:r>
+              <a:rPr lang="en-US" sz="3600" dirty="0"/>
               <a:t>TA</a:t>
             </a:r>
           </a:p>
           <a:p>
             <a:r>
-              <a:rPr lang="en-US" dirty="0"/>
+              <a:rPr lang="en-US" sz="3600" dirty="0"/>
               <a:t>Students (briefly! </a:t>
             </a:r>
             <a:r>
-              <a:rPr lang="en-US" dirty="0">
+              <a:rPr lang="en-US" sz="3600" dirty="0">
                 <a:sym typeface="Wingdings" panose="05000000000000000000" pitchFamily="2" charset="2"/>
               </a:rPr>
               <a:t> it’s a big class</a:t>
             </a:r>
             <a:r>
-              <a:rPr lang="en-US" dirty="0"/>
+              <a:rPr lang="en-US" sz="3600" dirty="0"/>
               <a:t>)</a:t>
             </a:r>
           </a:p>
           <a:p>
             <a:pPr lvl="1"/>
             <a:r>
-              <a:rPr lang="en-US" dirty="0"/>
+              <a:rPr lang="en-US" sz="3200" dirty="0"/>
               <a:t>What should we call you?</a:t>
             </a:r>
           </a:p>
           <a:p>
             <a:pPr lvl="1"/>
             <a:r>
-              <a:rPr lang="en-US" dirty="0"/>
+              <a:rPr lang="en-US" sz="3200" dirty="0"/>
               <a:t>What you do for fun/rejuvenation?</a:t>
             </a:r>
           </a:p>

</xml_diff>

<commit_message>
Update first-day slides with Ludden intro.
</commit_message>
<xml_diff>
--- a/ClassMaterials/JavaIntro/Slides/InstructorIntro.pptx
+++ b/ClassMaterials/JavaIntro/Slides/InstructorIntro.pptx
@@ -5,32 +5,36 @@
     <p:sldMasterId id="2147483648" r:id="rId1"/>
   </p:sldMasterIdLst>
   <p:notesMasterIdLst>
-    <p:notesMasterId r:id="rId25"/>
+    <p:notesMasterId r:id="rId29"/>
   </p:notesMasterIdLst>
   <p:sldIdLst>
     <p:sldId id="331" r:id="rId2"/>
     <p:sldId id="332" r:id="rId3"/>
     <p:sldId id="333" r:id="rId4"/>
-    <p:sldId id="334" r:id="rId5"/>
-    <p:sldId id="335" r:id="rId6"/>
-    <p:sldId id="336" r:id="rId7"/>
-    <p:sldId id="337" r:id="rId8"/>
-    <p:sldId id="338" r:id="rId9"/>
-    <p:sldId id="302" r:id="rId10"/>
-    <p:sldId id="303" r:id="rId11"/>
-    <p:sldId id="304" r:id="rId12"/>
-    <p:sldId id="305" r:id="rId13"/>
-    <p:sldId id="293" r:id="rId14"/>
-    <p:sldId id="294" r:id="rId15"/>
-    <p:sldId id="321" r:id="rId16"/>
-    <p:sldId id="284" r:id="rId17"/>
-    <p:sldId id="296" r:id="rId18"/>
-    <p:sldId id="297" r:id="rId19"/>
-    <p:sldId id="298" r:id="rId20"/>
-    <p:sldId id="285" r:id="rId21"/>
-    <p:sldId id="286" r:id="rId22"/>
-    <p:sldId id="287" r:id="rId23"/>
-    <p:sldId id="330" r:id="rId24"/>
+    <p:sldId id="342" r:id="rId5"/>
+    <p:sldId id="334" r:id="rId6"/>
+    <p:sldId id="335" r:id="rId7"/>
+    <p:sldId id="336" r:id="rId8"/>
+    <p:sldId id="337" r:id="rId9"/>
+    <p:sldId id="339" r:id="rId10"/>
+    <p:sldId id="340" r:id="rId11"/>
+    <p:sldId id="341" r:id="rId12"/>
+    <p:sldId id="338" r:id="rId13"/>
+    <p:sldId id="302" r:id="rId14"/>
+    <p:sldId id="303" r:id="rId15"/>
+    <p:sldId id="304" r:id="rId16"/>
+    <p:sldId id="305" r:id="rId17"/>
+    <p:sldId id="293" r:id="rId18"/>
+    <p:sldId id="294" r:id="rId19"/>
+    <p:sldId id="321" r:id="rId20"/>
+    <p:sldId id="284" r:id="rId21"/>
+    <p:sldId id="296" r:id="rId22"/>
+    <p:sldId id="297" r:id="rId23"/>
+    <p:sldId id="298" r:id="rId24"/>
+    <p:sldId id="285" r:id="rId25"/>
+    <p:sldId id="286" r:id="rId26"/>
+    <p:sldId id="287" r:id="rId27"/>
+    <p:sldId id="330" r:id="rId28"/>
   </p:sldIdLst>
   <p:sldSz cx="12192000" cy="6858000"/>
   <p:notesSz cx="6858000" cy="9144000"/>
@@ -219,7 +223,7 @@
           <a:p>
             <a:fld id="{A8CD1F60-86AF-274C-B759-04AFDD96F2D3}" type="datetimeFigureOut">
               <a:rPr lang="en-US" smtClean="0"/>
-              <a:t>11/27/2022</a:t>
+              <a:t>8/23/2023</a:t>
             </a:fld>
             <a:endParaRPr lang="en-US"/>
           </a:p>
@@ -632,6 +636,349 @@
     </p:spTree>
     <p:extLst>
       <p:ext uri="{BB962C8B-B14F-4D97-AF65-F5344CB8AC3E}">
+        <p14:creationId xmlns:p14="http://schemas.microsoft.com/office/powerpoint/2010/main" val="2115031717"/>
+      </p:ext>
+    </p:extLst>
+  </p:cSld>
+  <p:clrMapOvr>
+    <a:masterClrMapping/>
+  </p:clrMapOvr>
+</p:notes>
+</file>
+
+<file path=ppt/notesSlides/notesSlide11.xml><?xml version="1.0" encoding="utf-8"?>
+<p:notes xmlns:a="http://schemas.openxmlformats.org/drawingml/2006/main" xmlns:r="http://schemas.openxmlformats.org/officeDocument/2006/relationships" xmlns:p="http://schemas.openxmlformats.org/presentationml/2006/main">
+  <p:cSld>
+    <p:spTree>
+      <p:nvGrpSpPr>
+        <p:cNvPr id="1" name=""/>
+        <p:cNvGrpSpPr/>
+        <p:nvPr/>
+      </p:nvGrpSpPr>
+      <p:grpSpPr>
+        <a:xfrm>
+          <a:off x="0" y="0"/>
+          <a:ext cx="0" cy="0"/>
+          <a:chOff x="0" y="0"/>
+          <a:chExt cx="0" cy="0"/>
+        </a:xfrm>
+      </p:grpSpPr>
+      <p:sp>
+        <p:nvSpPr>
+          <p:cNvPr id="2" name="Slide Image Placeholder 1"/>
+          <p:cNvSpPr>
+            <a:spLocks noGrp="1" noRot="1" noChangeAspect="1"/>
+          </p:cNvSpPr>
+          <p:nvPr>
+            <p:ph type="sldImg"/>
+          </p:nvPr>
+        </p:nvSpPr>
+        <p:spPr/>
+      </p:sp>
+      <p:sp>
+        <p:nvSpPr>
+          <p:cNvPr id="3" name="Notes Placeholder 2"/>
+          <p:cNvSpPr>
+            <a:spLocks noGrp="1"/>
+          </p:cNvSpPr>
+          <p:nvPr>
+            <p:ph type="body" idx="1"/>
+          </p:nvPr>
+        </p:nvSpPr>
+        <p:spPr/>
+        <p:txBody>
+          <a:bodyPr/>
+          <a:lstStyle/>
+          <a:p>
+            <a:r>
+              <a:rPr lang="en-US" dirty="0"/>
+              <a:t>Introduce TA find</a:t>
+            </a:r>
+            <a:r>
+              <a:rPr lang="en-US" baseline="0" dirty="0"/>
+              <a:t> something each student does for rejuvenation…</a:t>
+            </a:r>
+            <a:endParaRPr lang="en-US" dirty="0"/>
+          </a:p>
+        </p:txBody>
+      </p:sp>
+    </p:spTree>
+    <p:extLst>
+      <p:ext uri="{BB962C8B-B14F-4D97-AF65-F5344CB8AC3E}">
+        <p14:creationId xmlns:p14="http://schemas.microsoft.com/office/powerpoint/2010/main" val="1082025156"/>
+      </p:ext>
+    </p:extLst>
+  </p:cSld>
+  <p:clrMapOvr>
+    <a:masterClrMapping/>
+  </p:clrMapOvr>
+</p:notes>
+</file>
+
+<file path=ppt/notesSlides/notesSlide12.xml><?xml version="1.0" encoding="utf-8"?>
+<p:notes xmlns:a="http://schemas.openxmlformats.org/drawingml/2006/main" xmlns:r="http://schemas.openxmlformats.org/officeDocument/2006/relationships" xmlns:p="http://schemas.openxmlformats.org/presentationml/2006/main">
+  <p:cSld>
+    <p:spTree>
+      <p:nvGrpSpPr>
+        <p:cNvPr id="1" name=""/>
+        <p:cNvGrpSpPr/>
+        <p:nvPr/>
+      </p:nvGrpSpPr>
+      <p:grpSpPr>
+        <a:xfrm>
+          <a:off x="0" y="0"/>
+          <a:ext cx="0" cy="0"/>
+          <a:chOff x="0" y="0"/>
+          <a:chExt cx="0" cy="0"/>
+        </a:xfrm>
+      </p:grpSpPr>
+      <p:sp>
+        <p:nvSpPr>
+          <p:cNvPr id="2" name="Slide Image Placeholder 1"/>
+          <p:cNvSpPr>
+            <a:spLocks noGrp="1" noRot="1" noChangeAspect="1"/>
+          </p:cNvSpPr>
+          <p:nvPr>
+            <p:ph type="sldImg"/>
+          </p:nvPr>
+        </p:nvSpPr>
+        <p:spPr/>
+      </p:sp>
+      <p:sp>
+        <p:nvSpPr>
+          <p:cNvPr id="3" name="Notes Placeholder 2"/>
+          <p:cNvSpPr>
+            <a:spLocks noGrp="1"/>
+          </p:cNvSpPr>
+          <p:nvPr>
+            <p:ph type="body" idx="1"/>
+          </p:nvPr>
+        </p:nvSpPr>
+        <p:spPr/>
+        <p:txBody>
+          <a:bodyPr/>
+          <a:lstStyle/>
+          <a:p>
+            <a:r>
+              <a:rPr lang="en-US" dirty="0"/>
+              <a:t>My reviews are consistent: </a:t>
+            </a:r>
+          </a:p>
+          <a:p>
+            <a:pPr lvl="1"/>
+            <a:r>
+              <a:rPr lang="en-US" dirty="0"/>
+              <a:t>Not around as often as I’d like, but responds very quickly to email.</a:t>
+            </a:r>
+          </a:p>
+          <a:p>
+            <a:endParaRPr lang="en-US" dirty="0"/>
+          </a:p>
+        </p:txBody>
+      </p:sp>
+    </p:spTree>
+    <p:extLst>
+      <p:ext uri="{BB962C8B-B14F-4D97-AF65-F5344CB8AC3E}">
+        <p14:creationId xmlns:p14="http://schemas.microsoft.com/office/powerpoint/2010/main" val="2662112512"/>
+      </p:ext>
+    </p:extLst>
+  </p:cSld>
+  <p:clrMapOvr>
+    <a:masterClrMapping/>
+  </p:clrMapOvr>
+</p:notes>
+</file>
+
+<file path=ppt/notesSlides/notesSlide13.xml><?xml version="1.0" encoding="utf-8"?>
+<p:notes xmlns:a="http://schemas.openxmlformats.org/drawingml/2006/main" xmlns:r="http://schemas.openxmlformats.org/officeDocument/2006/relationships" xmlns:p="http://schemas.openxmlformats.org/presentationml/2006/main">
+  <p:cSld>
+    <p:spTree>
+      <p:nvGrpSpPr>
+        <p:cNvPr id="1" name=""/>
+        <p:cNvGrpSpPr/>
+        <p:nvPr/>
+      </p:nvGrpSpPr>
+      <p:grpSpPr>
+        <a:xfrm>
+          <a:off x="0" y="0"/>
+          <a:ext cx="0" cy="0"/>
+          <a:chOff x="0" y="0"/>
+          <a:chExt cx="0" cy="0"/>
+        </a:xfrm>
+      </p:grpSpPr>
+      <p:sp>
+        <p:nvSpPr>
+          <p:cNvPr id="2" name="Slide Image Placeholder 1"/>
+          <p:cNvSpPr>
+            <a:spLocks noGrp="1" noRot="1" noChangeAspect="1"/>
+          </p:cNvSpPr>
+          <p:nvPr>
+            <p:ph type="sldImg"/>
+          </p:nvPr>
+        </p:nvSpPr>
+        <p:spPr/>
+      </p:sp>
+      <p:sp>
+        <p:nvSpPr>
+          <p:cNvPr id="3" name="Notes Placeholder 2"/>
+          <p:cNvSpPr>
+            <a:spLocks noGrp="1"/>
+          </p:cNvSpPr>
+          <p:nvPr>
+            <p:ph type="body" idx="1"/>
+          </p:nvPr>
+        </p:nvSpPr>
+        <p:spPr/>
+        <p:txBody>
+          <a:bodyPr/>
+          <a:lstStyle/>
+          <a:p>
+            <a:r>
+              <a:rPr lang="en-US" dirty="0"/>
+              <a:t>Why am</a:t>
+            </a:r>
+            <a:r>
+              <a:rPr lang="en-US" baseline="0" dirty="0"/>
+              <a:t> I doing this?</a:t>
+            </a:r>
+          </a:p>
+          <a:p>
+            <a:pPr marL="342900" indent="-342900">
+              <a:buFontTx/>
+              <a:buChar char="-"/>
+            </a:pPr>
+            <a:r>
+              <a:rPr lang="en-US" baseline="0" dirty="0"/>
+              <a:t>I don’t like repeating myself, and laptops are distracting. When I allow them to be open throughout class, I end up repeating myself and have students who have no idea what’s going on. For example, one year, I had a student who, three weeks into the class said he didn’t know what the schedule page was… There was more going on, but he was never forced to watch what was going on. Also, I know how tempting it is to turn on a game in the middle of class… don’t, 1) you won’t get the most out of this class… 2) You’re not as fast as you think you are at switching out of that game!</a:t>
+            </a:r>
+          </a:p>
+          <a:p>
+            <a:pPr marL="342900" indent="-342900">
+              <a:buFontTx/>
+              <a:buChar char="-"/>
+            </a:pPr>
+            <a:r>
+              <a:rPr lang="en-US" dirty="0"/>
+              <a:t>We</a:t>
+            </a:r>
+            <a:r>
+              <a:rPr lang="en-US" baseline="0" dirty="0"/>
+              <a:t> will do a lot of live-coding, so you will need your laptops, and for those portions of the class, no problem! But during lecture, when we’re not live-coding, I’ll ask you to close / lower your laptop lids so I know I have your attention</a:t>
+            </a:r>
+          </a:p>
+          <a:p>
+            <a:pPr marL="342900" indent="-342900">
+              <a:buFontTx/>
+              <a:buChar char="-"/>
+            </a:pPr>
+            <a:r>
+              <a:rPr lang="en-US" baseline="0" dirty="0"/>
+              <a:t>Phones / other devices: I’m not blind, I can see you’re texting someone… You’re looking down, not up, easy to spot.</a:t>
+            </a:r>
+          </a:p>
+          <a:p>
+            <a:pPr marL="342900" indent="-342900">
+              <a:buFontTx/>
+              <a:buChar char="-"/>
+            </a:pPr>
+            <a:r>
+              <a:rPr lang="en-US" baseline="0" dirty="0"/>
+              <a:t>Since we will open and close our laptops a lot, I’m okay if you only close it so you can’t see the screen, rather than all the way, but barely tilted doesn’t cut it.</a:t>
+            </a:r>
+          </a:p>
+          <a:p>
+            <a:pPr marL="342900" indent="-342900">
+              <a:buFontTx/>
+              <a:buChar char="-"/>
+            </a:pPr>
+            <a:r>
+              <a:rPr lang="en-US" baseline="0" dirty="0"/>
+              <a:t>I know some people take notes on their laptops… If that’s you, I would ask that you come to my office after class and show me an example of the notes that you typically take on your laptop and I’ll make an exception. However, a lot of the notes taken in here should be on the daily quizzes, which we’ll get to shortly.</a:t>
+            </a:r>
+          </a:p>
+          <a:p>
+            <a:pPr marL="342900" indent="-342900">
+              <a:buFontTx/>
+              <a:buChar char="-"/>
+            </a:pPr>
+            <a:r>
+              <a:rPr lang="en-US" baseline="0" dirty="0"/>
+              <a:t>With all that said… please close (or at least lower) your laptop screens for the moment.</a:t>
+            </a:r>
+          </a:p>
+          <a:p>
+            <a:pPr marL="342900" indent="-342900">
+              <a:buFontTx/>
+              <a:buChar char="-"/>
+            </a:pPr>
+            <a:endParaRPr lang="en-US" dirty="0"/>
+          </a:p>
+        </p:txBody>
+      </p:sp>
+    </p:spTree>
+    <p:extLst>
+      <p:ext uri="{BB962C8B-B14F-4D97-AF65-F5344CB8AC3E}">
+        <p14:creationId xmlns:p14="http://schemas.microsoft.com/office/powerpoint/2010/main" val="2313550064"/>
+      </p:ext>
+    </p:extLst>
+  </p:cSld>
+  <p:clrMapOvr>
+    <a:masterClrMapping/>
+  </p:clrMapOvr>
+</p:notes>
+</file>
+
+<file path=ppt/notesSlides/notesSlide14.xml><?xml version="1.0" encoding="utf-8"?>
+<p:notes xmlns:a="http://schemas.openxmlformats.org/drawingml/2006/main" xmlns:r="http://schemas.openxmlformats.org/officeDocument/2006/relationships" xmlns:p="http://schemas.openxmlformats.org/presentationml/2006/main">
+  <p:cSld>
+    <p:spTree>
+      <p:nvGrpSpPr>
+        <p:cNvPr id="1" name=""/>
+        <p:cNvGrpSpPr/>
+        <p:nvPr/>
+      </p:nvGrpSpPr>
+      <p:grpSpPr>
+        <a:xfrm>
+          <a:off x="0" y="0"/>
+          <a:ext cx="0" cy="0"/>
+          <a:chOff x="0" y="0"/>
+          <a:chExt cx="0" cy="0"/>
+        </a:xfrm>
+      </p:grpSpPr>
+      <p:sp>
+        <p:nvSpPr>
+          <p:cNvPr id="2" name="Slide Image Placeholder 1"/>
+          <p:cNvSpPr>
+            <a:spLocks noGrp="1" noRot="1" noChangeAspect="1"/>
+          </p:cNvSpPr>
+          <p:nvPr>
+            <p:ph type="sldImg"/>
+          </p:nvPr>
+        </p:nvSpPr>
+        <p:spPr/>
+      </p:sp>
+      <p:sp>
+        <p:nvSpPr>
+          <p:cNvPr id="3" name="Notes Placeholder 2"/>
+          <p:cNvSpPr>
+            <a:spLocks noGrp="1"/>
+          </p:cNvSpPr>
+          <p:nvPr>
+            <p:ph type="body" idx="1"/>
+          </p:nvPr>
+        </p:nvSpPr>
+        <p:spPr/>
+        <p:txBody>
+          <a:bodyPr/>
+          <a:lstStyle/>
+          <a:p>
+            <a:endParaRPr lang="en-US" dirty="0"/>
+          </a:p>
+        </p:txBody>
+      </p:sp>
+    </p:spTree>
+    <p:extLst>
+      <p:ext uri="{BB962C8B-B14F-4D97-AF65-F5344CB8AC3E}">
         <p14:creationId xmlns:p14="http://schemas.microsoft.com/office/powerpoint/2010/main" val="942096835"/>
       </p:ext>
     </p:extLst>
@@ -642,7 +989,7 @@
 </p:notes>
 </file>
 
-<file path=ppt/notesSlides/notesSlide11.xml><?xml version="1.0" encoding="utf-8"?>
+<file path=ppt/notesSlides/notesSlide15.xml><?xml version="1.0" encoding="utf-8"?>
 <p:notes xmlns:a="http://schemas.openxmlformats.org/drawingml/2006/main" xmlns:r="http://schemas.openxmlformats.org/officeDocument/2006/relationships" xmlns:p="http://schemas.openxmlformats.org/presentationml/2006/main">
   <p:cSld>
     <p:spTree>
@@ -868,11 +1215,11 @@
 </file>
 
 <file path=ppt/notesSlides/notesSlide4.xml><?xml version="1.0" encoding="utf-8"?>
-<p:notes xmlns:a="http://schemas.openxmlformats.org/drawingml/2006/main" xmlns:r="http://schemas.openxmlformats.org/officeDocument/2006/relationships" xmlns:p="http://schemas.openxmlformats.org/presentationml/2006/main">
+<p:notes xmlns:a="http://schemas.openxmlformats.org/drawingml/2006/main" xmlns:r="http://schemas.openxmlformats.org/officeDocument/2006/relationships" xmlns:p="http://schemas.openxmlformats.org/presentationml/2006/main" showMasterSp="0" showMasterPhAnim="0">
   <p:cSld>
     <p:spTree>
       <p:nvGrpSpPr>
-        <p:cNvPr id="1" name=""/>
+        <p:cNvPr id="1" name="Shape 135"/>
         <p:cNvGrpSpPr/>
         <p:nvPr/>
       </p:nvGrpSpPr>
@@ -886,39 +1233,151 @@
       </p:grpSpPr>
       <p:sp>
         <p:nvSpPr>
-          <p:cNvPr id="2" name="Slide Image Placeholder 1"/>
+          <p:cNvPr id="136" name="Google Shape;136;p8:notes"/>
           <p:cNvSpPr>
             <a:spLocks noGrp="1" noRot="1" noChangeAspect="1"/>
           </p:cNvSpPr>
           <p:nvPr>
-            <p:ph type="sldImg"/>
-          </p:nvPr>
-        </p:nvSpPr>
-        <p:spPr/>
-      </p:sp>
-      <p:sp>
-        <p:nvSpPr>
-          <p:cNvPr id="3" name="Notes Placeholder 2"/>
-          <p:cNvSpPr>
+            <p:ph type="sldImg" idx="2"/>
+          </p:nvPr>
+        </p:nvSpPr>
+        <p:spPr>
+          <a:xfrm>
+            <a:off x="717550" y="1162050"/>
+            <a:ext cx="5575300" cy="3136900"/>
+          </a:xfrm>
+          <a:custGeom>
+            <a:avLst/>
+            <a:gdLst/>
+            <a:ahLst/>
+            <a:cxnLst/>
+            <a:rect l="l" t="t" r="r" b="b"/>
+            <a:pathLst>
+              <a:path w="120000" h="120000" extrusionOk="0">
+                <a:moveTo>
+                  <a:pt x="0" y="0"/>
+                </a:moveTo>
+                <a:lnTo>
+                  <a:pt x="120000" y="0"/>
+                </a:lnTo>
+                <a:lnTo>
+                  <a:pt x="120000" y="120000"/>
+                </a:lnTo>
+                <a:lnTo>
+                  <a:pt x="0" y="120000"/>
+                </a:lnTo>
+                <a:close/>
+              </a:path>
+            </a:pathLst>
+          </a:custGeom>
+          <a:noFill/>
+          <a:ln w="12700" cap="flat" cmpd="sng">
+            <a:solidFill>
+              <a:srgbClr val="000000"/>
+            </a:solidFill>
+            <a:prstDash val="solid"/>
+            <a:round/>
+            <a:headEnd type="none" w="sm" len="sm"/>
+            <a:tailEnd type="none" w="sm" len="sm"/>
+          </a:ln>
+        </p:spPr>
+      </p:sp>
+      <p:sp>
+        <p:nvSpPr>
+          <p:cNvPr id="137" name="Google Shape;137;p8:notes"/>
+          <p:cNvSpPr txBox="1">
             <a:spLocks noGrp="1"/>
           </p:cNvSpPr>
           <p:nvPr>
             <p:ph type="body" idx="1"/>
           </p:nvPr>
         </p:nvSpPr>
-        <p:spPr/>
-        <p:txBody>
-          <a:bodyPr/>
-          <a:lstStyle/>
-          <a:p>
-            <a:endParaRPr lang="en-US" dirty="0"/>
+        <p:spPr>
+          <a:xfrm>
+            <a:off x="701040" y="4473892"/>
+            <a:ext cx="5608320" cy="3660458"/>
+          </a:xfrm>
+          <a:prstGeom prst="rect">
+            <a:avLst/>
+          </a:prstGeom>
+          <a:noFill/>
+          <a:ln>
+            <a:noFill/>
+          </a:ln>
+        </p:spPr>
+        <p:txBody>
+          <a:bodyPr spcFirstLastPara="1" wrap="square" lIns="93175" tIns="46575" rIns="93175" bIns="46575" anchor="t" anchorCtr="0">
+            <a:noAutofit/>
+          </a:bodyPr>
+          <a:lstStyle/>
+          <a:p>
+            <a:pPr marL="0" lvl="0" indent="0" algn="l" rtl="0">
+              <a:spcBef>
+                <a:spcPts val="0"/>
+              </a:spcBef>
+              <a:spcAft>
+                <a:spcPts val="0"/>
+              </a:spcAft>
+              <a:buNone/>
+            </a:pPr>
+            <a:r>
+              <a:rPr lang="en-US" dirty="0"/>
+              <a:t>Distinguish passive and active learning. Briefly motivate all the active learning activities we will use in class. </a:t>
+            </a:r>
+            <a:endParaRPr dirty="0"/>
+          </a:p>
+        </p:txBody>
+      </p:sp>
+      <p:sp>
+        <p:nvSpPr>
+          <p:cNvPr id="138" name="Google Shape;138;p8:notes"/>
+          <p:cNvSpPr txBox="1">
+            <a:spLocks noGrp="1"/>
+          </p:cNvSpPr>
+          <p:nvPr>
+            <p:ph type="sldNum" idx="12"/>
+          </p:nvPr>
+        </p:nvSpPr>
+        <p:spPr>
+          <a:xfrm>
+            <a:off x="3970938" y="8829967"/>
+            <a:ext cx="3037840" cy="466433"/>
+          </a:xfrm>
+          <a:prstGeom prst="rect">
+            <a:avLst/>
+          </a:prstGeom>
+          <a:noFill/>
+          <a:ln>
+            <a:noFill/>
+          </a:ln>
+        </p:spPr>
+        <p:txBody>
+          <a:bodyPr spcFirstLastPara="1" wrap="square" lIns="93175" tIns="46575" rIns="93175" bIns="46575" anchor="b" anchorCtr="0">
+            <a:noAutofit/>
+          </a:bodyPr>
+          <a:lstStyle/>
+          <a:p>
+            <a:pPr marL="0" lvl="0" indent="0" algn="r" rtl="0">
+              <a:spcBef>
+                <a:spcPts val="0"/>
+              </a:spcBef>
+              <a:spcAft>
+                <a:spcPts val="0"/>
+              </a:spcAft>
+              <a:buNone/>
+            </a:pPr>
+            <a:fld id="{00000000-1234-1234-1234-123412341234}" type="slidenum">
+              <a:rPr lang="en-US"/>
+              <a:t>4</a:t>
+            </a:fld>
+            <a:endParaRPr/>
           </a:p>
         </p:txBody>
       </p:sp>
     </p:spTree>
     <p:extLst>
       <p:ext uri="{BB962C8B-B14F-4D97-AF65-F5344CB8AC3E}">
-        <p14:creationId xmlns:p14="http://schemas.microsoft.com/office/powerpoint/2010/main" val="895517178"/>
+        <p14:creationId xmlns:p14="http://schemas.microsoft.com/office/powerpoint/2010/main" val="1489197322"/>
       </p:ext>
     </p:extLst>
   </p:cSld>
@@ -979,7 +1438,7 @@
     </p:spTree>
     <p:extLst>
       <p:ext uri="{BB962C8B-B14F-4D97-AF65-F5344CB8AC3E}">
-        <p14:creationId xmlns:p14="http://schemas.microsoft.com/office/powerpoint/2010/main" val="939788822"/>
+        <p14:creationId xmlns:p14="http://schemas.microsoft.com/office/powerpoint/2010/main" val="895517178"/>
       </p:ext>
     </p:extLst>
   </p:cSld>
@@ -1040,7 +1499,7 @@
     </p:spTree>
     <p:extLst>
       <p:ext uri="{BB962C8B-B14F-4D97-AF65-F5344CB8AC3E}">
-        <p14:creationId xmlns:p14="http://schemas.microsoft.com/office/powerpoint/2010/main" val="456082107"/>
+        <p14:creationId xmlns:p14="http://schemas.microsoft.com/office/powerpoint/2010/main" val="939788822"/>
       </p:ext>
     </p:extLst>
   </p:cSld>
@@ -1094,14 +1553,6 @@
           <a:bodyPr/>
           <a:lstStyle/>
           <a:p>
-            <a:r>
-              <a:rPr lang="en-US" dirty="0"/>
-              <a:t>Introduce TA find</a:t>
-            </a:r>
-            <a:r>
-              <a:rPr lang="en-US" baseline="0" dirty="0"/>
-              <a:t> something each student does for rejuvenation…</a:t>
-            </a:r>
             <a:endParaRPr lang="en-US" dirty="0"/>
           </a:p>
         </p:txBody>
@@ -1109,7 +1560,7 @@
     </p:spTree>
     <p:extLst>
       <p:ext uri="{BB962C8B-B14F-4D97-AF65-F5344CB8AC3E}">
-        <p14:creationId xmlns:p14="http://schemas.microsoft.com/office/powerpoint/2010/main" val="1082025156"/>
+        <p14:creationId xmlns:p14="http://schemas.microsoft.com/office/powerpoint/2010/main" val="456082107"/>
       </p:ext>
     </p:extLst>
   </p:cSld>
@@ -1163,19 +1614,6 @@
           <a:bodyPr/>
           <a:lstStyle/>
           <a:p>
-            <a:r>
-              <a:rPr lang="en-US" dirty="0"/>
-              <a:t>My reviews are consistent: </a:t>
-            </a:r>
-          </a:p>
-          <a:p>
-            <a:pPr lvl="1"/>
-            <a:r>
-              <a:rPr lang="en-US" dirty="0"/>
-              <a:t>Not around as often as I’d like, but responds very quickly to email.</a:t>
-            </a:r>
-          </a:p>
-          <a:p>
             <a:endParaRPr lang="en-US" dirty="0"/>
           </a:p>
         </p:txBody>
@@ -1183,7 +1621,7 @@
     </p:spTree>
     <p:extLst>
       <p:ext uri="{BB962C8B-B14F-4D97-AF65-F5344CB8AC3E}">
-        <p14:creationId xmlns:p14="http://schemas.microsoft.com/office/powerpoint/2010/main" val="2662112512"/>
+        <p14:creationId xmlns:p14="http://schemas.microsoft.com/office/powerpoint/2010/main" val="2953583462"/>
       </p:ext>
     </p:extLst>
   </p:cSld>
@@ -1237,84 +1675,6 @@
           <a:bodyPr/>
           <a:lstStyle/>
           <a:p>
-            <a:r>
-              <a:rPr lang="en-US" dirty="0"/>
-              <a:t>Why am</a:t>
-            </a:r>
-            <a:r>
-              <a:rPr lang="en-US" baseline="0" dirty="0"/>
-              <a:t> I doing this?</a:t>
-            </a:r>
-          </a:p>
-          <a:p>
-            <a:pPr marL="342900" indent="-342900">
-              <a:buFontTx/>
-              <a:buChar char="-"/>
-            </a:pPr>
-            <a:r>
-              <a:rPr lang="en-US" baseline="0" dirty="0"/>
-              <a:t>I don’t like repeating myself, and laptops are distracting. When I allow them to be open throughout class, I end up repeating myself and have students who have no idea what’s going on. For example, one year, I had a student who, three weeks into the class said he didn’t know what the schedule page was… There was more going on, but he was never forced to watch what was going on. Also, I know how tempting it is to turn on a game in the middle of class… don’t, 1) you won’t get the most out of this class… 2) You’re not as fast as you think you are at switching out of that game!</a:t>
-            </a:r>
-          </a:p>
-          <a:p>
-            <a:pPr marL="342900" indent="-342900">
-              <a:buFontTx/>
-              <a:buChar char="-"/>
-            </a:pPr>
-            <a:r>
-              <a:rPr lang="en-US" dirty="0"/>
-              <a:t>We</a:t>
-            </a:r>
-            <a:r>
-              <a:rPr lang="en-US" baseline="0" dirty="0"/>
-              <a:t> will do a lot of live-coding, so you will need your laptops, and for those portions of the class, no problem! But during lecture, when we’re not live-coding, I’ll ask you to close / lower your laptop lids so I know I have your attention</a:t>
-            </a:r>
-          </a:p>
-          <a:p>
-            <a:pPr marL="342900" indent="-342900">
-              <a:buFontTx/>
-              <a:buChar char="-"/>
-            </a:pPr>
-            <a:r>
-              <a:rPr lang="en-US" baseline="0" dirty="0"/>
-              <a:t>Phones / other devices: I’m not blind, I can see you’re texting someone… You’re looking down, not up, easy to spot.</a:t>
-            </a:r>
-          </a:p>
-          <a:p>
-            <a:pPr marL="342900" indent="-342900">
-              <a:buFontTx/>
-              <a:buChar char="-"/>
-            </a:pPr>
-            <a:r>
-              <a:rPr lang="en-US" baseline="0" dirty="0"/>
-              <a:t>Since we will open and close our laptops a lot, I’m okay if you only close it so you can’t see the screen, rather than all the way, but barely tilted doesn’t cut it.</a:t>
-            </a:r>
-          </a:p>
-          <a:p>
-            <a:pPr marL="342900" indent="-342900">
-              <a:buFontTx/>
-              <a:buChar char="-"/>
-            </a:pPr>
-            <a:r>
-              <a:rPr lang="en-US" baseline="0" dirty="0"/>
-              <a:t>I know some people take notes on their laptops… If that’s you, I would ask that you come to my office after class and show me an example of the notes that you typically take on your laptop and I’ll make an exception. However, a lot of the notes taken in here should be on the daily quizzes, which we’ll get to shortly.</a:t>
-            </a:r>
-          </a:p>
-          <a:p>
-            <a:pPr marL="342900" indent="-342900">
-              <a:buFontTx/>
-              <a:buChar char="-"/>
-            </a:pPr>
-            <a:r>
-              <a:rPr lang="en-US" baseline="0" dirty="0"/>
-              <a:t>With all that said… please close (or at least lower) your laptop screens for the moment.</a:t>
-            </a:r>
-          </a:p>
-          <a:p>
-            <a:pPr marL="342900" indent="-342900">
-              <a:buFontTx/>
-              <a:buChar char="-"/>
-            </a:pPr>
             <a:endParaRPr lang="en-US" dirty="0"/>
           </a:p>
         </p:txBody>
@@ -1322,7 +1682,7 @@
     </p:spTree>
     <p:extLst>
       <p:ext uri="{BB962C8B-B14F-4D97-AF65-F5344CB8AC3E}">
-        <p14:creationId xmlns:p14="http://schemas.microsoft.com/office/powerpoint/2010/main" val="2313550064"/>
+        <p14:creationId xmlns:p14="http://schemas.microsoft.com/office/powerpoint/2010/main" val="1651894184"/>
       </p:ext>
     </p:extLst>
   </p:cSld>
@@ -1479,7 +1839,7 @@
           <a:p>
             <a:fld id="{1558ECB0-78E8-2947-93F5-766FFF283DA8}" type="datetimeFigureOut">
               <a:rPr lang="en-US" smtClean="0"/>
-              <a:t>11/27/2022</a:t>
+              <a:t>8/23/2023</a:t>
             </a:fld>
             <a:endParaRPr lang="en-US"/>
           </a:p>
@@ -1677,7 +2037,7 @@
           <a:p>
             <a:fld id="{1558ECB0-78E8-2947-93F5-766FFF283DA8}" type="datetimeFigureOut">
               <a:rPr lang="en-US" smtClean="0"/>
-              <a:t>11/27/2022</a:t>
+              <a:t>8/23/2023</a:t>
             </a:fld>
             <a:endParaRPr lang="en-US"/>
           </a:p>
@@ -1885,7 +2245,7 @@
           <a:p>
             <a:fld id="{1558ECB0-78E8-2947-93F5-766FFF283DA8}" type="datetimeFigureOut">
               <a:rPr lang="en-US" smtClean="0"/>
-              <a:t>11/27/2022</a:t>
+              <a:t>8/23/2023</a:t>
             </a:fld>
             <a:endParaRPr lang="en-US"/>
           </a:p>
@@ -2083,7 +2443,7 @@
           <a:p>
             <a:fld id="{1558ECB0-78E8-2947-93F5-766FFF283DA8}" type="datetimeFigureOut">
               <a:rPr lang="en-US" smtClean="0"/>
-              <a:t>11/27/2022</a:t>
+              <a:t>8/23/2023</a:t>
             </a:fld>
             <a:endParaRPr lang="en-US"/>
           </a:p>
@@ -2358,7 +2718,7 @@
           <a:p>
             <a:fld id="{1558ECB0-78E8-2947-93F5-766FFF283DA8}" type="datetimeFigureOut">
               <a:rPr lang="en-US" smtClean="0"/>
-              <a:t>11/27/2022</a:t>
+              <a:t>8/23/2023</a:t>
             </a:fld>
             <a:endParaRPr lang="en-US"/>
           </a:p>
@@ -2623,7 +2983,7 @@
           <a:p>
             <a:fld id="{1558ECB0-78E8-2947-93F5-766FFF283DA8}" type="datetimeFigureOut">
               <a:rPr lang="en-US" smtClean="0"/>
-              <a:t>11/27/2022</a:t>
+              <a:t>8/23/2023</a:t>
             </a:fld>
             <a:endParaRPr lang="en-US"/>
           </a:p>
@@ -3035,7 +3395,7 @@
           <a:p>
             <a:fld id="{1558ECB0-78E8-2947-93F5-766FFF283DA8}" type="datetimeFigureOut">
               <a:rPr lang="en-US" smtClean="0"/>
-              <a:t>11/27/2022</a:t>
+              <a:t>8/23/2023</a:t>
             </a:fld>
             <a:endParaRPr lang="en-US"/>
           </a:p>
@@ -3176,7 +3536,7 @@
           <a:p>
             <a:fld id="{1558ECB0-78E8-2947-93F5-766FFF283DA8}" type="datetimeFigureOut">
               <a:rPr lang="en-US" smtClean="0"/>
-              <a:t>11/27/2022</a:t>
+              <a:t>8/23/2023</a:t>
             </a:fld>
             <a:endParaRPr lang="en-US"/>
           </a:p>
@@ -3289,7 +3649,7 @@
           <a:p>
             <a:fld id="{1558ECB0-78E8-2947-93F5-766FFF283DA8}" type="datetimeFigureOut">
               <a:rPr lang="en-US" smtClean="0"/>
-              <a:t>11/27/2022</a:t>
+              <a:t>8/23/2023</a:t>
             </a:fld>
             <a:endParaRPr lang="en-US"/>
           </a:p>
@@ -3600,7 +3960,7 @@
           <a:p>
             <a:fld id="{1558ECB0-78E8-2947-93F5-766FFF283DA8}" type="datetimeFigureOut">
               <a:rPr lang="en-US" smtClean="0"/>
-              <a:t>11/27/2022</a:t>
+              <a:t>8/23/2023</a:t>
             </a:fld>
             <a:endParaRPr lang="en-US"/>
           </a:p>
@@ -3888,7 +4248,7 @@
           <a:p>
             <a:fld id="{1558ECB0-78E8-2947-93F5-766FFF283DA8}" type="datetimeFigureOut">
               <a:rPr lang="en-US" smtClean="0"/>
-              <a:t>11/27/2022</a:t>
+              <a:t>8/23/2023</a:t>
             </a:fld>
             <a:endParaRPr lang="en-US"/>
           </a:p>
@@ -4129,7 +4489,7 @@
           <a:p>
             <a:fld id="{1558ECB0-78E8-2947-93F5-766FFF283DA8}" type="datetimeFigureOut">
               <a:rPr lang="en-US" smtClean="0"/>
-              <a:t>11/27/2022</a:t>
+              <a:t>8/23/2023</a:t>
             </a:fld>
             <a:endParaRPr lang="en-US"/>
           </a:p>
@@ -4874,8 +5234,8 @@
         </p:nvSpPr>
         <p:spPr>
           <a:xfrm>
-            <a:off x="1981200" y="1447800"/>
-            <a:ext cx="8229600" cy="5257800"/>
+            <a:off x="838199" y="1379621"/>
+            <a:ext cx="10295021" cy="4764505"/>
           </a:xfrm>
         </p:spPr>
         <p:txBody>
@@ -4885,78 +5245,74 @@
           <a:lstStyle/>
           <a:p>
             <a:r>
-              <a:rPr lang="en-US" dirty="0"/>
-              <a:t>Education</a:t>
+              <a:rPr lang="en-US" sz="3200" dirty="0"/>
+              <a:t>General questions (HW, course logistics): </a:t>
             </a:r>
           </a:p>
           <a:p>
             <a:pPr lvl="1"/>
             <a:r>
-              <a:rPr lang="en-US" dirty="0"/>
-              <a:t>Rose-</a:t>
-            </a:r>
-            <a:r>
-              <a:rPr lang="en-US" dirty="0" err="1"/>
-              <a:t>Hulman</a:t>
-            </a:r>
-            <a:r>
-              <a:rPr lang="en-US" dirty="0"/>
-              <a:t> Institute of Technology 2008</a:t>
+              <a:rPr lang="en-US" sz="2800" dirty="0"/>
+              <a:t>Please use Piazza</a:t>
+            </a:r>
+          </a:p>
+          <a:p>
+            <a:pPr lvl="1"/>
+            <a:r>
+              <a:rPr lang="en-US" sz="2800" dirty="0"/>
+              <a:t>TAs or other students may be able to respond faster</a:t>
+            </a:r>
+          </a:p>
+          <a:p>
+            <a:endParaRPr lang="en-US" sz="3200" dirty="0"/>
+          </a:p>
+          <a:p>
+            <a:r>
+              <a:rPr lang="en-US" sz="3200" dirty="0"/>
+              <a:t>Personal questions: </a:t>
+            </a:r>
+          </a:p>
+          <a:p>
+            <a:pPr lvl="1"/>
+            <a:r>
+              <a:rPr lang="en-US" sz="2800" dirty="0"/>
+              <a:t>Email</a:t>
+            </a:r>
+          </a:p>
+          <a:p>
+            <a:pPr lvl="1"/>
+            <a:r>
+              <a:rPr lang="en-US" sz="2800" dirty="0"/>
+              <a:t>Office hours</a:t>
+            </a:r>
+          </a:p>
+          <a:p>
+            <a:pPr lvl="1"/>
+            <a:r>
+              <a:rPr lang="en-US" sz="2800" dirty="0"/>
+              <a:t>1-1 meeting, scheduled via link in email signature</a:t>
             </a:r>
           </a:p>
           <a:p>
             <a:pPr lvl="2"/>
             <a:r>
-              <a:rPr lang="en-US" dirty="0"/>
-              <a:t>B.S. in Computer Science and Software Engineering</a:t>
-            </a:r>
-          </a:p>
-          <a:p>
-            <a:r>
-              <a:rPr lang="en-US" dirty="0"/>
-              <a:t>Experience:</a:t>
-            </a:r>
-          </a:p>
-          <a:p>
-            <a:pPr lvl="1"/>
-            <a:r>
-              <a:rPr lang="en-US" dirty="0"/>
-              <a:t>Amadeus Consulting, 2008-2010</a:t>
-            </a:r>
-          </a:p>
-          <a:p>
-            <a:pPr lvl="1"/>
-            <a:r>
-              <a:rPr lang="en-US" dirty="0"/>
-              <a:t>Software Engineering Professionals (SEP), 2010-2014</a:t>
-            </a:r>
-          </a:p>
-          <a:p>
-            <a:pPr lvl="1"/>
-            <a:r>
-              <a:rPr lang="en-US" dirty="0"/>
-              <a:t>Stouder Software Consulting, LLC (2014-present)</a:t>
-            </a:r>
-          </a:p>
-          <a:p>
-            <a:pPr lvl="1"/>
-            <a:r>
-              <a:rPr lang="en-US" dirty="0"/>
-              <a:t>RHIT: Visiting Professor CSSE (2013-2016)</a:t>
-            </a:r>
-          </a:p>
-          <a:p>
-            <a:pPr marL="0" indent="0">
-              <a:buNone/>
-            </a:pPr>
-            <a:endParaRPr lang="en-US" dirty="0"/>
+              <a:rPr lang="en-US" sz="2400" dirty="0"/>
+              <a:t>Helps me plan my time effectively</a:t>
+            </a:r>
+          </a:p>
+          <a:p>
+            <a:pPr lvl="2"/>
+            <a:r>
+              <a:rPr lang="en-US" sz="2400" dirty="0"/>
+              <a:t>Email me if you can’t find a time</a:t>
+            </a:r>
           </a:p>
         </p:txBody>
       </p:sp>
     </p:spTree>
     <p:extLst>
       <p:ext uri="{BB962C8B-B14F-4D97-AF65-F5344CB8AC3E}">
-        <p14:creationId xmlns:p14="http://schemas.microsoft.com/office/powerpoint/2010/main" val="3531852098"/>
+        <p14:creationId xmlns:p14="http://schemas.microsoft.com/office/powerpoint/2010/main" val="1848748188"/>
       </p:ext>
     </p:extLst>
   </p:cSld>
@@ -5015,6 +5371,542 @@
             <p:ph type="body" idx="1"/>
           </p:nvPr>
         </p:nvSpPr>
+        <p:spPr>
+          <a:xfrm>
+            <a:off x="962890" y="1295400"/>
+            <a:ext cx="10515600" cy="5470524"/>
+          </a:xfrm>
+        </p:spPr>
+        <p:txBody>
+          <a:bodyPr>
+            <a:normAutofit/>
+          </a:bodyPr>
+          <a:lstStyle/>
+          <a:p>
+            <a:r>
+              <a:rPr lang="en-US" sz="3200" dirty="0"/>
+              <a:t>More about me</a:t>
+            </a:r>
+          </a:p>
+          <a:p>
+            <a:r>
+              <a:rPr lang="en-US" sz="3200" dirty="0"/>
+              <a:t>When I was a student here: </a:t>
+            </a:r>
+          </a:p>
+          <a:p>
+            <a:pPr lvl="1"/>
+            <a:r>
+              <a:rPr lang="en-US" sz="2800" dirty="0"/>
+              <a:t>Cross Country, Engineers Without Borders, symphony orchestra, musicals, improv club, St. Joseph’s University Ministry</a:t>
+            </a:r>
+          </a:p>
+          <a:p>
+            <a:pPr lvl="1"/>
+            <a:r>
+              <a:rPr lang="en-US" sz="2800" dirty="0"/>
+              <a:t>Friends &amp; activities helped me make it through Rose</a:t>
+            </a:r>
+          </a:p>
+          <a:p>
+            <a:pPr lvl="2"/>
+            <a:r>
+              <a:rPr lang="en-US" sz="2400" dirty="0"/>
+              <a:t>Find your people! </a:t>
+            </a:r>
+          </a:p>
+          <a:p>
+            <a:pPr lvl="1"/>
+            <a:endParaRPr lang="en-US" sz="2800" dirty="0"/>
+          </a:p>
+          <a:p>
+            <a:r>
+              <a:rPr lang="en-US" sz="3200" dirty="0"/>
+              <a:t>Interested in working with students on research</a:t>
+            </a:r>
+          </a:p>
+          <a:p>
+            <a:pPr lvl="1"/>
+            <a:r>
+              <a:rPr lang="en-US" sz="2800" dirty="0"/>
+              <a:t>Feel free to schedule appt. or email if you have interest in research</a:t>
+            </a:r>
+          </a:p>
+          <a:p>
+            <a:pPr lvl="1"/>
+            <a:r>
+              <a:rPr lang="en-US" sz="2800" dirty="0"/>
+              <a:t>Graph theory, algorithmic game theory, operations research</a:t>
+            </a:r>
+          </a:p>
+          <a:p>
+            <a:pPr lvl="1"/>
+            <a:r>
+              <a:rPr lang="en-US" sz="2800" dirty="0"/>
+              <a:t>Most projects require CSSE 473, but we can talk before then</a:t>
+            </a:r>
+            <a:endParaRPr lang="en-US" dirty="0"/>
+          </a:p>
+        </p:txBody>
+      </p:sp>
+    </p:spTree>
+    <p:extLst>
+      <p:ext uri="{BB962C8B-B14F-4D97-AF65-F5344CB8AC3E}">
+        <p14:creationId xmlns:p14="http://schemas.microsoft.com/office/powerpoint/2010/main" val="1055126336"/>
+      </p:ext>
+    </p:extLst>
+  </p:cSld>
+  <p:clrMapOvr>
+    <a:masterClrMapping/>
+  </p:clrMapOvr>
+</p:sld>
+</file>
+
+<file path=ppt/slides/slide12.xml><?xml version="1.0" encoding="utf-8"?>
+<p:sld xmlns:a="http://schemas.openxmlformats.org/drawingml/2006/main" xmlns:r="http://schemas.openxmlformats.org/officeDocument/2006/relationships" xmlns:p="http://schemas.openxmlformats.org/presentationml/2006/main">
+  <p:cSld>
+    <p:spTree>
+      <p:nvGrpSpPr>
+        <p:cNvPr id="1" name=""/>
+        <p:cNvGrpSpPr/>
+        <p:nvPr/>
+      </p:nvGrpSpPr>
+      <p:grpSpPr>
+        <a:xfrm>
+          <a:off x="0" y="0"/>
+          <a:ext cx="0" cy="0"/>
+          <a:chOff x="0" y="0"/>
+          <a:chExt cx="0" cy="0"/>
+        </a:xfrm>
+      </p:grpSpPr>
+      <p:sp>
+        <p:nvSpPr>
+          <p:cNvPr id="2" name="Title 1"/>
+          <p:cNvSpPr>
+            <a:spLocks noGrp="1"/>
+          </p:cNvSpPr>
+          <p:nvPr>
+            <p:ph type="title"/>
+          </p:nvPr>
+        </p:nvSpPr>
+        <p:spPr/>
+        <p:txBody>
+          <a:bodyPr/>
+          <a:lstStyle/>
+          <a:p>
+            <a:r>
+              <a:rPr lang="en-US" dirty="0"/>
+              <a:t>Introductions</a:t>
+            </a:r>
+          </a:p>
+        </p:txBody>
+      </p:sp>
+      <p:sp>
+        <p:nvSpPr>
+          <p:cNvPr id="3" name="Text Placeholder 2"/>
+          <p:cNvSpPr>
+            <a:spLocks noGrp="1"/>
+          </p:cNvSpPr>
+          <p:nvPr>
+            <p:ph type="body" idx="1"/>
+          </p:nvPr>
+        </p:nvSpPr>
+        <p:spPr>
+          <a:xfrm>
+            <a:off x="1634971" y="1675152"/>
+            <a:ext cx="8229600" cy="2819400"/>
+          </a:xfrm>
+        </p:spPr>
+        <p:txBody>
+          <a:bodyPr>
+            <a:normAutofit/>
+          </a:bodyPr>
+          <a:lstStyle/>
+          <a:p>
+            <a:r>
+              <a:rPr lang="en-US" sz="3600" dirty="0"/>
+              <a:t>TA</a:t>
+            </a:r>
+          </a:p>
+          <a:p>
+            <a:r>
+              <a:rPr lang="en-US" sz="3600" dirty="0"/>
+              <a:t>Students (briefly! </a:t>
+            </a:r>
+            <a:r>
+              <a:rPr lang="en-US" sz="3600" dirty="0">
+                <a:sym typeface="Wingdings" panose="05000000000000000000" pitchFamily="2" charset="2"/>
+              </a:rPr>
+              <a:t> it’s a big class</a:t>
+            </a:r>
+            <a:r>
+              <a:rPr lang="en-US" sz="3600" dirty="0"/>
+              <a:t>)</a:t>
+            </a:r>
+          </a:p>
+          <a:p>
+            <a:pPr lvl="1"/>
+            <a:r>
+              <a:rPr lang="en-US" sz="3200" dirty="0"/>
+              <a:t>What should we call you?</a:t>
+            </a:r>
+          </a:p>
+          <a:p>
+            <a:pPr lvl="1"/>
+            <a:r>
+              <a:rPr lang="en-US" sz="3200" dirty="0"/>
+              <a:t>What you do for fun/rejuvenation?</a:t>
+            </a:r>
+          </a:p>
+        </p:txBody>
+      </p:sp>
+    </p:spTree>
+    <p:extLst>
+      <p:ext uri="{BB962C8B-B14F-4D97-AF65-F5344CB8AC3E}">
+        <p14:creationId xmlns:p14="http://schemas.microsoft.com/office/powerpoint/2010/main" val="1613605203"/>
+      </p:ext>
+    </p:extLst>
+  </p:cSld>
+  <p:clrMapOvr>
+    <a:masterClrMapping/>
+  </p:clrMapOvr>
+</p:sld>
+</file>
+
+<file path=ppt/slides/slide13.xml><?xml version="1.0" encoding="utf-8"?>
+<p:sld xmlns:a="http://schemas.openxmlformats.org/drawingml/2006/main" xmlns:r="http://schemas.openxmlformats.org/officeDocument/2006/relationships" xmlns:p="http://schemas.openxmlformats.org/presentationml/2006/main" show="0">
+  <p:cSld>
+    <p:spTree>
+      <p:nvGrpSpPr>
+        <p:cNvPr id="1" name=""/>
+        <p:cNvGrpSpPr/>
+        <p:nvPr/>
+      </p:nvGrpSpPr>
+      <p:grpSpPr>
+        <a:xfrm>
+          <a:off x="0" y="0"/>
+          <a:ext cx="0" cy="0"/>
+          <a:chOff x="0" y="0"/>
+          <a:chExt cx="0" cy="0"/>
+        </a:xfrm>
+      </p:grpSpPr>
+      <p:sp>
+        <p:nvSpPr>
+          <p:cNvPr id="2" name="Title 1"/>
+          <p:cNvSpPr>
+            <a:spLocks noGrp="1"/>
+          </p:cNvSpPr>
+          <p:nvPr>
+            <p:ph type="title"/>
+          </p:nvPr>
+        </p:nvSpPr>
+        <p:spPr/>
+        <p:txBody>
+          <a:bodyPr/>
+          <a:lstStyle/>
+          <a:p>
+            <a:r>
+              <a:rPr lang="en-US" dirty="0"/>
+              <a:t>Instructor Info</a:t>
+            </a:r>
+          </a:p>
+        </p:txBody>
+      </p:sp>
+      <p:sp>
+        <p:nvSpPr>
+          <p:cNvPr id="3" name="Text Placeholder 2"/>
+          <p:cNvSpPr>
+            <a:spLocks noGrp="1"/>
+          </p:cNvSpPr>
+          <p:nvPr>
+            <p:ph type="body" idx="1"/>
+          </p:nvPr>
+        </p:nvSpPr>
+        <p:spPr>
+          <a:xfrm>
+            <a:off x="1981200" y="1371600"/>
+            <a:ext cx="8229600" cy="5486400"/>
+          </a:xfrm>
+        </p:spPr>
+        <p:txBody>
+          <a:bodyPr/>
+          <a:lstStyle/>
+          <a:p>
+            <a:r>
+              <a:rPr lang="en-US" dirty="0"/>
+              <a:t>Amanda Stouder</a:t>
+            </a:r>
+          </a:p>
+          <a:p>
+            <a:pPr lvl="1"/>
+            <a:r>
+              <a:rPr lang="en-US" dirty="0"/>
+              <a:t>Assistant Professor for the Practice of Computer Science and Software Engineering</a:t>
+            </a:r>
+          </a:p>
+          <a:p>
+            <a:pPr lvl="1"/>
+            <a:r>
+              <a:rPr lang="en-US" dirty="0"/>
+              <a:t>You can call me:</a:t>
+            </a:r>
+          </a:p>
+          <a:p>
+            <a:pPr lvl="2"/>
+            <a:r>
+              <a:rPr lang="en-US" dirty="0"/>
+              <a:t>Amanda</a:t>
+            </a:r>
+          </a:p>
+          <a:p>
+            <a:pPr lvl="2"/>
+            <a:r>
+              <a:rPr lang="en-US" dirty="0"/>
+              <a:t>Professor Stouder</a:t>
+            </a:r>
+          </a:p>
+          <a:p>
+            <a:pPr lvl="1"/>
+            <a:r>
+              <a:rPr lang="en-US" dirty="0"/>
+              <a:t>Don’t call me:</a:t>
+            </a:r>
+          </a:p>
+          <a:p>
+            <a:pPr lvl="2"/>
+            <a:r>
+              <a:rPr lang="en-US" strike="sngStrike" dirty="0"/>
+              <a:t>Mrs. Stouder</a:t>
+            </a:r>
+            <a:r>
+              <a:rPr lang="en-US" dirty="0"/>
+              <a:t> (please not this)</a:t>
+            </a:r>
+          </a:p>
+          <a:p>
+            <a:pPr lvl="2"/>
+            <a:r>
+              <a:rPr lang="en-US" strike="sngStrike" dirty="0"/>
+              <a:t>Dr. Stouder</a:t>
+            </a:r>
+            <a:r>
+              <a:rPr lang="en-US" dirty="0"/>
+              <a:t> (not this either, I’ll explain)</a:t>
+            </a:r>
+          </a:p>
+          <a:p>
+            <a:pPr marL="0" indent="0">
+              <a:buNone/>
+            </a:pPr>
+            <a:endParaRPr lang="en-US" dirty="0"/>
+          </a:p>
+        </p:txBody>
+      </p:sp>
+    </p:spTree>
+    <p:extLst>
+      <p:ext uri="{BB962C8B-B14F-4D97-AF65-F5344CB8AC3E}">
+        <p14:creationId xmlns:p14="http://schemas.microsoft.com/office/powerpoint/2010/main" val="4221316393"/>
+      </p:ext>
+    </p:extLst>
+  </p:cSld>
+  <p:clrMapOvr>
+    <a:masterClrMapping/>
+  </p:clrMapOvr>
+</p:sld>
+</file>
+
+<file path=ppt/slides/slide14.xml><?xml version="1.0" encoding="utf-8"?>
+<p:sld xmlns:a="http://schemas.openxmlformats.org/drawingml/2006/main" xmlns:r="http://schemas.openxmlformats.org/officeDocument/2006/relationships" xmlns:p="http://schemas.openxmlformats.org/presentationml/2006/main" show="0">
+  <p:cSld>
+    <p:spTree>
+      <p:nvGrpSpPr>
+        <p:cNvPr id="1" name=""/>
+        <p:cNvGrpSpPr/>
+        <p:nvPr/>
+      </p:nvGrpSpPr>
+      <p:grpSpPr>
+        <a:xfrm>
+          <a:off x="0" y="0"/>
+          <a:ext cx="0" cy="0"/>
+          <a:chOff x="0" y="0"/>
+          <a:chExt cx="0" cy="0"/>
+        </a:xfrm>
+      </p:grpSpPr>
+      <p:sp>
+        <p:nvSpPr>
+          <p:cNvPr id="2" name="Title 1"/>
+          <p:cNvSpPr>
+            <a:spLocks noGrp="1"/>
+          </p:cNvSpPr>
+          <p:nvPr>
+            <p:ph type="title"/>
+          </p:nvPr>
+        </p:nvSpPr>
+        <p:spPr/>
+        <p:txBody>
+          <a:bodyPr/>
+          <a:lstStyle/>
+          <a:p>
+            <a:r>
+              <a:rPr lang="en-US" dirty="0"/>
+              <a:t>Instructor Info</a:t>
+            </a:r>
+          </a:p>
+        </p:txBody>
+      </p:sp>
+      <p:sp>
+        <p:nvSpPr>
+          <p:cNvPr id="3" name="Text Placeholder 2"/>
+          <p:cNvSpPr>
+            <a:spLocks noGrp="1"/>
+          </p:cNvSpPr>
+          <p:nvPr>
+            <p:ph type="body" idx="1"/>
+          </p:nvPr>
+        </p:nvSpPr>
+        <p:spPr>
+          <a:xfrm>
+            <a:off x="1981200" y="1447800"/>
+            <a:ext cx="8229600" cy="5257800"/>
+          </a:xfrm>
+        </p:spPr>
+        <p:txBody>
+          <a:bodyPr>
+            <a:normAutofit/>
+          </a:bodyPr>
+          <a:lstStyle/>
+          <a:p>
+            <a:r>
+              <a:rPr lang="en-US" dirty="0"/>
+              <a:t>Education</a:t>
+            </a:r>
+          </a:p>
+          <a:p>
+            <a:pPr lvl="1"/>
+            <a:r>
+              <a:rPr lang="en-US" dirty="0"/>
+              <a:t>Rose-</a:t>
+            </a:r>
+            <a:r>
+              <a:rPr lang="en-US" dirty="0" err="1"/>
+              <a:t>Hulman</a:t>
+            </a:r>
+            <a:r>
+              <a:rPr lang="en-US" dirty="0"/>
+              <a:t> Institute of Technology 2008</a:t>
+            </a:r>
+          </a:p>
+          <a:p>
+            <a:pPr lvl="2"/>
+            <a:r>
+              <a:rPr lang="en-US" dirty="0"/>
+              <a:t>B.S. in Computer Science and Software Engineering</a:t>
+            </a:r>
+          </a:p>
+          <a:p>
+            <a:r>
+              <a:rPr lang="en-US" dirty="0"/>
+              <a:t>Experience:</a:t>
+            </a:r>
+          </a:p>
+          <a:p>
+            <a:pPr lvl="1"/>
+            <a:r>
+              <a:rPr lang="en-US" dirty="0"/>
+              <a:t>Amadeus Consulting, 2008-2010</a:t>
+            </a:r>
+          </a:p>
+          <a:p>
+            <a:pPr lvl="1"/>
+            <a:r>
+              <a:rPr lang="en-US" dirty="0"/>
+              <a:t>Software Engineering Professionals (SEP), 2010-2014</a:t>
+            </a:r>
+          </a:p>
+          <a:p>
+            <a:pPr lvl="1"/>
+            <a:r>
+              <a:rPr lang="en-US" dirty="0"/>
+              <a:t>Stouder Software Consulting, LLC (2014-present)</a:t>
+            </a:r>
+          </a:p>
+          <a:p>
+            <a:pPr lvl="1"/>
+            <a:r>
+              <a:rPr lang="en-US" dirty="0"/>
+              <a:t>RHIT: Visiting Professor CSSE (2013-2016)</a:t>
+            </a:r>
+          </a:p>
+          <a:p>
+            <a:pPr marL="0" indent="0">
+              <a:buNone/>
+            </a:pPr>
+            <a:endParaRPr lang="en-US" dirty="0"/>
+          </a:p>
+        </p:txBody>
+      </p:sp>
+    </p:spTree>
+    <p:extLst>
+      <p:ext uri="{BB962C8B-B14F-4D97-AF65-F5344CB8AC3E}">
+        <p14:creationId xmlns:p14="http://schemas.microsoft.com/office/powerpoint/2010/main" val="3531852098"/>
+      </p:ext>
+    </p:extLst>
+  </p:cSld>
+  <p:clrMapOvr>
+    <a:masterClrMapping/>
+  </p:clrMapOvr>
+</p:sld>
+</file>
+
+<file path=ppt/slides/slide15.xml><?xml version="1.0" encoding="utf-8"?>
+<p:sld xmlns:a="http://schemas.openxmlformats.org/drawingml/2006/main" xmlns:r="http://schemas.openxmlformats.org/officeDocument/2006/relationships" xmlns:p="http://schemas.openxmlformats.org/presentationml/2006/main" show="0">
+  <p:cSld>
+    <p:spTree>
+      <p:nvGrpSpPr>
+        <p:cNvPr id="1" name=""/>
+        <p:cNvGrpSpPr/>
+        <p:nvPr/>
+      </p:nvGrpSpPr>
+      <p:grpSpPr>
+        <a:xfrm>
+          <a:off x="0" y="0"/>
+          <a:ext cx="0" cy="0"/>
+          <a:chOff x="0" y="0"/>
+          <a:chExt cx="0" cy="0"/>
+        </a:xfrm>
+      </p:grpSpPr>
+      <p:sp>
+        <p:nvSpPr>
+          <p:cNvPr id="2" name="Title 1"/>
+          <p:cNvSpPr>
+            <a:spLocks noGrp="1"/>
+          </p:cNvSpPr>
+          <p:nvPr>
+            <p:ph type="title"/>
+          </p:nvPr>
+        </p:nvSpPr>
+        <p:spPr/>
+        <p:txBody>
+          <a:bodyPr/>
+          <a:lstStyle/>
+          <a:p>
+            <a:r>
+              <a:rPr lang="en-US" dirty="0"/>
+              <a:t>Instructor Info</a:t>
+            </a:r>
+          </a:p>
+        </p:txBody>
+      </p:sp>
+      <p:sp>
+        <p:nvSpPr>
+          <p:cNvPr id="3" name="Text Placeholder 2"/>
+          <p:cNvSpPr>
+            <a:spLocks noGrp="1"/>
+          </p:cNvSpPr>
+          <p:nvPr>
+            <p:ph type="body" idx="1"/>
+          </p:nvPr>
+        </p:nvSpPr>
         <p:spPr/>
         <p:txBody>
           <a:bodyPr/>
@@ -5068,7 +5960,7 @@
 </p:sld>
 </file>
 
-<file path=ppt/slides/slide12.xml><?xml version="1.0" encoding="utf-8"?>
+<file path=ppt/slides/slide16.xml><?xml version="1.0" encoding="utf-8"?>
 <p:sld xmlns:a="http://schemas.openxmlformats.org/drawingml/2006/main" xmlns:r="http://schemas.openxmlformats.org/officeDocument/2006/relationships" xmlns:p="http://schemas.openxmlformats.org/presentationml/2006/main" show="0">
   <p:cSld>
     <p:spTree>
@@ -5571,7 +6463,7 @@
 </p:sld>
 </file>
 
-<file path=ppt/slides/slide13.xml><?xml version="1.0" encoding="utf-8"?>
+<file path=ppt/slides/slide17.xml><?xml version="1.0" encoding="utf-8"?>
 <p:sld xmlns:a="http://schemas.openxmlformats.org/drawingml/2006/main" xmlns:r="http://schemas.openxmlformats.org/officeDocument/2006/relationships" xmlns:p="http://schemas.openxmlformats.org/presentationml/2006/main" show="0">
   <p:cSld>
     <p:spTree>
@@ -5693,7 +6585,7 @@
 </p:sld>
 </file>
 
-<file path=ppt/slides/slide14.xml><?xml version="1.0" encoding="utf-8"?>
+<file path=ppt/slides/slide18.xml><?xml version="1.0" encoding="utf-8"?>
 <p:sld xmlns:a="http://schemas.openxmlformats.org/drawingml/2006/main" xmlns:r="http://schemas.openxmlformats.org/officeDocument/2006/relationships" xmlns:p="http://schemas.openxmlformats.org/presentationml/2006/main" show="0">
   <p:cSld>
     <p:spTree>
@@ -6470,7 +7362,7 @@
 </p:sld>
 </file>
 
-<file path=ppt/slides/slide15.xml><?xml version="1.0" encoding="utf-8"?>
+<file path=ppt/slides/slide19.xml><?xml version="1.0" encoding="utf-8"?>
 <p:sld xmlns:a="http://schemas.openxmlformats.org/drawingml/2006/main" xmlns:r="http://schemas.openxmlformats.org/officeDocument/2006/relationships" xmlns:p="http://schemas.openxmlformats.org/presentationml/2006/main" show="0">
   <p:cSld>
     <p:spTree>
@@ -6571,7 +7463,138 @@
 </p:sld>
 </file>
 
-<file path=ppt/slides/slide16.xml><?xml version="1.0" encoding="utf-8"?>
+<file path=ppt/slides/slide2.xml><?xml version="1.0" encoding="utf-8"?>
+<p:sld xmlns:a="http://schemas.openxmlformats.org/drawingml/2006/main" xmlns:r="http://schemas.openxmlformats.org/officeDocument/2006/relationships" xmlns:p="http://schemas.openxmlformats.org/presentationml/2006/main">
+  <p:cSld>
+    <p:spTree>
+      <p:nvGrpSpPr>
+        <p:cNvPr id="1" name=""/>
+        <p:cNvGrpSpPr/>
+        <p:nvPr/>
+      </p:nvGrpSpPr>
+      <p:grpSpPr>
+        <a:xfrm>
+          <a:off x="0" y="0"/>
+          <a:ext cx="0" cy="0"/>
+          <a:chOff x="0" y="0"/>
+          <a:chExt cx="0" cy="0"/>
+        </a:xfrm>
+      </p:grpSpPr>
+      <p:sp>
+        <p:nvSpPr>
+          <p:cNvPr id="54" name="Shape 54"/>
+          <p:cNvSpPr>
+            <a:spLocks noGrp="1"/>
+          </p:cNvSpPr>
+          <p:nvPr>
+            <p:ph type="title"/>
+          </p:nvPr>
+        </p:nvSpPr>
+        <p:spPr>
+          <a:xfrm>
+            <a:off x="3181350" y="2455071"/>
+            <a:ext cx="5829300" cy="1102519"/>
+          </a:xfrm>
+          <a:prstGeom prst="rect">
+            <a:avLst/>
+          </a:prstGeom>
+        </p:spPr>
+        <p:txBody>
+          <a:bodyPr/>
+          <a:lstStyle/>
+          <a:p>
+            <a:pPr lvl="0">
+              <a:defRPr sz="1800"/>
+            </a:pPr>
+            <a:r>
+              <a:rPr sz="3300"/>
+              <a:t>Course Introduction,</a:t>
+            </a:r>
+            <a:br>
+              <a:rPr sz="3300"/>
+            </a:br>
+            <a:r>
+              <a:rPr sz="3300"/>
+              <a:t>Starting with Java</a:t>
+            </a:r>
+          </a:p>
+        </p:txBody>
+      </p:sp>
+      <p:sp>
+        <p:nvSpPr>
+          <p:cNvPr id="55" name="Shape 55"/>
+          <p:cNvSpPr>
+            <a:spLocks noGrp="1"/>
+          </p:cNvSpPr>
+          <p:nvPr>
+            <p:ph type="body" idx="1"/>
+          </p:nvPr>
+        </p:nvSpPr>
+        <p:spPr>
+          <a:xfrm>
+            <a:off x="3695700" y="3771900"/>
+            <a:ext cx="4800600" cy="1314450"/>
+          </a:xfrm>
+          <a:prstGeom prst="rect">
+            <a:avLst/>
+          </a:prstGeom>
+        </p:spPr>
+        <p:txBody>
+          <a:bodyPr/>
+          <a:lstStyle/>
+          <a:p>
+            <a:pPr defTabSz="651510">
+              <a:spcBef>
+                <a:spcPts val="375"/>
+              </a:spcBef>
+              <a:defRPr sz="1800">
+                <a:solidFill>
+                  <a:srgbClr val="000000"/>
+                </a:solidFill>
+              </a:defRPr>
+            </a:pPr>
+            <a:r>
+              <a:rPr sz="1710">
+                <a:solidFill>
+                  <a:srgbClr val="888888"/>
+                </a:solidFill>
+              </a:rPr>
+              <a:t>CSSE 220—Object-Oriented Software Development</a:t>
+            </a:r>
+          </a:p>
+          <a:p>
+            <a:pPr defTabSz="651510">
+              <a:defRPr sz="1800">
+                <a:solidFill>
+                  <a:srgbClr val="000000"/>
+                </a:solidFill>
+              </a:defRPr>
+            </a:pPr>
+            <a:r>
+              <a:rPr sz="2280">
+                <a:solidFill>
+                  <a:srgbClr val="888888"/>
+                </a:solidFill>
+              </a:rPr>
+              <a:t>Rose-Hulman Institute of Technology</a:t>
+            </a:r>
+          </a:p>
+        </p:txBody>
+      </p:sp>
+    </p:spTree>
+    <p:extLst>
+      <p:ext uri="{BB962C8B-B14F-4D97-AF65-F5344CB8AC3E}">
+        <p14:creationId xmlns:p14="http://schemas.microsoft.com/office/powerpoint/2010/main" val="795713637"/>
+      </p:ext>
+    </p:extLst>
+  </p:cSld>
+  <p:clrMapOvr>
+    <a:masterClrMapping/>
+  </p:clrMapOvr>
+</p:sld>
+</file>
+
+<file path=ppt/slides/slide20.xml><?xml version="1.0" encoding="utf-8"?>
 <p:sld xmlns:a="http://schemas.openxmlformats.org/drawingml/2006/main" xmlns:r="http://schemas.openxmlformats.org/officeDocument/2006/relationships" xmlns:p="http://schemas.openxmlformats.org/presentationml/2006/main" show="0">
   <p:cSld>
     <p:spTree>
@@ -6652,7 +7675,7 @@
 </p:sld>
 </file>
 
-<file path=ppt/slides/slide17.xml><?xml version="1.0" encoding="utf-8"?>
+<file path=ppt/slides/slide21.xml><?xml version="1.0" encoding="utf-8"?>
 <p:sld xmlns:a="http://schemas.openxmlformats.org/drawingml/2006/main" xmlns:r="http://schemas.openxmlformats.org/officeDocument/2006/relationships" xmlns:p="http://schemas.openxmlformats.org/presentationml/2006/main" show="0">
   <p:cSld>
     <p:spTree>
@@ -6750,7 +7773,7 @@
 </p:sld>
 </file>
 
-<file path=ppt/slides/slide18.xml><?xml version="1.0" encoding="utf-8"?>
+<file path=ppt/slides/slide22.xml><?xml version="1.0" encoding="utf-8"?>
 <p:sld xmlns:a="http://schemas.openxmlformats.org/drawingml/2006/main" xmlns:r="http://schemas.openxmlformats.org/officeDocument/2006/relationships" xmlns:p="http://schemas.openxmlformats.org/presentationml/2006/main" show="0">
   <p:cSld>
     <p:spTree>
@@ -6848,7 +7871,7 @@
 </p:sld>
 </file>
 
-<file path=ppt/slides/slide19.xml><?xml version="1.0" encoding="utf-8"?>
+<file path=ppt/slides/slide23.xml><?xml version="1.0" encoding="utf-8"?>
 <p:sld xmlns:a="http://schemas.openxmlformats.org/drawingml/2006/main" xmlns:r="http://schemas.openxmlformats.org/officeDocument/2006/relationships" xmlns:p="http://schemas.openxmlformats.org/presentationml/2006/main" show="0">
   <p:cSld>
     <p:spTree>
@@ -6943,138 +7966,7 @@
 </p:sld>
 </file>
 
-<file path=ppt/slides/slide2.xml><?xml version="1.0" encoding="utf-8"?>
-<p:sld xmlns:a="http://schemas.openxmlformats.org/drawingml/2006/main" xmlns:r="http://schemas.openxmlformats.org/officeDocument/2006/relationships" xmlns:p="http://schemas.openxmlformats.org/presentationml/2006/main">
-  <p:cSld>
-    <p:spTree>
-      <p:nvGrpSpPr>
-        <p:cNvPr id="1" name=""/>
-        <p:cNvGrpSpPr/>
-        <p:nvPr/>
-      </p:nvGrpSpPr>
-      <p:grpSpPr>
-        <a:xfrm>
-          <a:off x="0" y="0"/>
-          <a:ext cx="0" cy="0"/>
-          <a:chOff x="0" y="0"/>
-          <a:chExt cx="0" cy="0"/>
-        </a:xfrm>
-      </p:grpSpPr>
-      <p:sp>
-        <p:nvSpPr>
-          <p:cNvPr id="54" name="Shape 54"/>
-          <p:cNvSpPr>
-            <a:spLocks noGrp="1"/>
-          </p:cNvSpPr>
-          <p:nvPr>
-            <p:ph type="title"/>
-          </p:nvPr>
-        </p:nvSpPr>
-        <p:spPr>
-          <a:xfrm>
-            <a:off x="3181350" y="2455071"/>
-            <a:ext cx="5829300" cy="1102519"/>
-          </a:xfrm>
-          <a:prstGeom prst="rect">
-            <a:avLst/>
-          </a:prstGeom>
-        </p:spPr>
-        <p:txBody>
-          <a:bodyPr/>
-          <a:lstStyle/>
-          <a:p>
-            <a:pPr lvl="0">
-              <a:defRPr sz="1800"/>
-            </a:pPr>
-            <a:r>
-              <a:rPr sz="3300"/>
-              <a:t>Course Introduction,</a:t>
-            </a:r>
-            <a:br>
-              <a:rPr sz="3300"/>
-            </a:br>
-            <a:r>
-              <a:rPr sz="3300"/>
-              <a:t>Starting with Java</a:t>
-            </a:r>
-          </a:p>
-        </p:txBody>
-      </p:sp>
-      <p:sp>
-        <p:nvSpPr>
-          <p:cNvPr id="55" name="Shape 55"/>
-          <p:cNvSpPr>
-            <a:spLocks noGrp="1"/>
-          </p:cNvSpPr>
-          <p:nvPr>
-            <p:ph type="body" idx="1"/>
-          </p:nvPr>
-        </p:nvSpPr>
-        <p:spPr>
-          <a:xfrm>
-            <a:off x="3695700" y="3771900"/>
-            <a:ext cx="4800600" cy="1314450"/>
-          </a:xfrm>
-          <a:prstGeom prst="rect">
-            <a:avLst/>
-          </a:prstGeom>
-        </p:spPr>
-        <p:txBody>
-          <a:bodyPr/>
-          <a:lstStyle/>
-          <a:p>
-            <a:pPr defTabSz="651510">
-              <a:spcBef>
-                <a:spcPts val="375"/>
-              </a:spcBef>
-              <a:defRPr sz="1800">
-                <a:solidFill>
-                  <a:srgbClr val="000000"/>
-                </a:solidFill>
-              </a:defRPr>
-            </a:pPr>
-            <a:r>
-              <a:rPr sz="1710">
-                <a:solidFill>
-                  <a:srgbClr val="888888"/>
-                </a:solidFill>
-              </a:rPr>
-              <a:t>CSSE 220—Object-Oriented Software Development</a:t>
-            </a:r>
-          </a:p>
-          <a:p>
-            <a:pPr defTabSz="651510">
-              <a:defRPr sz="1800">
-                <a:solidFill>
-                  <a:srgbClr val="000000"/>
-                </a:solidFill>
-              </a:defRPr>
-            </a:pPr>
-            <a:r>
-              <a:rPr sz="2280">
-                <a:solidFill>
-                  <a:srgbClr val="888888"/>
-                </a:solidFill>
-              </a:rPr>
-              <a:t>Rose-Hulman Institute of Technology</a:t>
-            </a:r>
-          </a:p>
-        </p:txBody>
-      </p:sp>
-    </p:spTree>
-    <p:extLst>
-      <p:ext uri="{BB962C8B-B14F-4D97-AF65-F5344CB8AC3E}">
-        <p14:creationId xmlns:p14="http://schemas.microsoft.com/office/powerpoint/2010/main" val="795713637"/>
-      </p:ext>
-    </p:extLst>
-  </p:cSld>
-  <p:clrMapOvr>
-    <a:masterClrMapping/>
-  </p:clrMapOvr>
-</p:sld>
-</file>
-
-<file path=ppt/slides/slide20.xml><?xml version="1.0" encoding="utf-8"?>
+<file path=ppt/slides/slide24.xml><?xml version="1.0" encoding="utf-8"?>
 <p:sld xmlns:a="http://schemas.openxmlformats.org/drawingml/2006/main" xmlns:r="http://schemas.openxmlformats.org/officeDocument/2006/relationships" xmlns:p="http://schemas.openxmlformats.org/presentationml/2006/main" show="0">
   <p:cSld>
     <p:spTree>
@@ -7190,7 +8082,7 @@
 </p:sld>
 </file>
 
-<file path=ppt/slides/slide21.xml><?xml version="1.0" encoding="utf-8"?>
+<file path=ppt/slides/slide25.xml><?xml version="1.0" encoding="utf-8"?>
 <p:sld xmlns:a="http://schemas.openxmlformats.org/drawingml/2006/main" xmlns:r="http://schemas.openxmlformats.org/officeDocument/2006/relationships" xmlns:p="http://schemas.openxmlformats.org/presentationml/2006/main" show="0">
   <p:cSld>
     <p:spTree>
@@ -7332,7 +8224,7 @@
 </p:sld>
 </file>
 
-<file path=ppt/slides/slide22.xml><?xml version="1.0" encoding="utf-8"?>
+<file path=ppt/slides/slide26.xml><?xml version="1.0" encoding="utf-8"?>
 <p:sld xmlns:a="http://schemas.openxmlformats.org/drawingml/2006/main" xmlns:r="http://schemas.openxmlformats.org/officeDocument/2006/relationships" xmlns:p="http://schemas.openxmlformats.org/presentationml/2006/main" show="0">
   <p:cSld>
     <p:spTree>
@@ -7478,7 +8370,7 @@
 </p:sld>
 </file>
 
-<file path=ppt/slides/slide23.xml><?xml version="1.0" encoding="utf-8"?>
+<file path=ppt/slides/slide27.xml><?xml version="1.0" encoding="utf-8"?>
 <p:sld xmlns:a="http://schemas.openxmlformats.org/drawingml/2006/main" xmlns:r="http://schemas.openxmlformats.org/officeDocument/2006/relationships" xmlns:p="http://schemas.openxmlformats.org/presentationml/2006/main" show="0">
   <p:cSld>
     <p:spTree>
@@ -7732,11 +8624,11 @@
 </file>
 
 <file path=ppt/slides/slide4.xml><?xml version="1.0" encoding="utf-8"?>
-<p:sld xmlns:a="http://schemas.openxmlformats.org/drawingml/2006/main" xmlns:r="http://schemas.openxmlformats.org/officeDocument/2006/relationships" xmlns:p="http://schemas.openxmlformats.org/presentationml/2006/main">
+<p:sld xmlns:a="http://schemas.openxmlformats.org/drawingml/2006/main" xmlns:r="http://schemas.openxmlformats.org/officeDocument/2006/relationships" xmlns:p="http://schemas.openxmlformats.org/presentationml/2006/main" show="0">
   <p:cSld>
     <p:spTree>
       <p:nvGrpSpPr>
-        <p:cNvPr id="1" name=""/>
+        <p:cNvPr id="1" name="Shape 139"/>
         <p:cNvGrpSpPr/>
         <p:nvPr/>
       </p:nvGrpSpPr>
@@ -7748,98 +8640,248 @@
           <a:chExt cx="0" cy="0"/>
         </a:xfrm>
       </p:grpSpPr>
-      <p:sp>
-        <p:nvSpPr>
-          <p:cNvPr id="2" name="Title 1"/>
-          <p:cNvSpPr>
-            <a:spLocks noGrp="1"/>
-          </p:cNvSpPr>
-          <p:nvPr>
-            <p:ph type="title"/>
-          </p:nvPr>
-        </p:nvSpPr>
-        <p:spPr/>
+      <p:pic>
+        <p:nvPicPr>
+          <p:cNvPr id="2" name="Picture 1">
+            <a:extLst>
+              <a:ext uri="{FF2B5EF4-FFF2-40B4-BE49-F238E27FC236}">
+                <a16:creationId xmlns:a16="http://schemas.microsoft.com/office/drawing/2014/main" id="{66CE3D4F-82A0-7F50-FC53-697AB2AC2AE6}"/>
+              </a:ext>
+            </a:extLst>
+          </p:cNvPr>
+          <p:cNvPicPr>
+            <a:picLocks noChangeAspect="1"/>
+          </p:cNvPicPr>
+          <p:nvPr/>
+        </p:nvPicPr>
+        <p:blipFill>
+          <a:blip r:embed="rId3"/>
+          <a:stretch>
+            <a:fillRect/>
+          </a:stretch>
+        </p:blipFill>
+        <p:spPr>
+          <a:xfrm>
+            <a:off x="1535261" y="2125600"/>
+            <a:ext cx="2871465" cy="4029805"/>
+          </a:xfrm>
+          <a:prstGeom prst="rect">
+            <a:avLst/>
+          </a:prstGeom>
+        </p:spPr>
+      </p:pic>
+      <p:pic>
+        <p:nvPicPr>
+          <p:cNvPr id="3" name="Picture 2">
+            <a:extLst>
+              <a:ext uri="{FF2B5EF4-FFF2-40B4-BE49-F238E27FC236}">
+                <a16:creationId xmlns:a16="http://schemas.microsoft.com/office/drawing/2014/main" id="{E7604838-5C1D-CAD5-7263-2CFE995ABC32}"/>
+              </a:ext>
+            </a:extLst>
+          </p:cNvPr>
+          <p:cNvPicPr>
+            <a:picLocks noChangeAspect="1"/>
+          </p:cNvPicPr>
+          <p:nvPr/>
+        </p:nvPicPr>
+        <p:blipFill>
+          <a:blip r:embed="rId4"/>
+          <a:stretch>
+            <a:fillRect/>
+          </a:stretch>
+        </p:blipFill>
+        <p:spPr>
+          <a:xfrm>
+            <a:off x="7352138" y="3277844"/>
+            <a:ext cx="4328535" cy="2877561"/>
+          </a:xfrm>
+          <a:prstGeom prst="rect">
+            <a:avLst/>
+          </a:prstGeom>
+        </p:spPr>
+      </p:pic>
+      <p:sp>
+        <p:nvSpPr>
+          <p:cNvPr id="4" name="Title 1">
+            <a:extLst>
+              <a:ext uri="{FF2B5EF4-FFF2-40B4-BE49-F238E27FC236}">
+                <a16:creationId xmlns:a16="http://schemas.microsoft.com/office/drawing/2014/main" id="{D5927EF3-F66A-14B1-D400-698603AD5457}"/>
+              </a:ext>
+            </a:extLst>
+          </p:cNvPr>
+          <p:cNvSpPr txBox="1">
+            <a:spLocks/>
+          </p:cNvSpPr>
+          <p:nvPr/>
+        </p:nvSpPr>
+        <p:spPr>
+          <a:xfrm>
+            <a:off x="419100" y="365125"/>
+            <a:ext cx="11353800" cy="1325563"/>
+          </a:xfrm>
+          <a:prstGeom prst="rect">
+            <a:avLst/>
+          </a:prstGeom>
+        </p:spPr>
         <p:txBody>
           <a:bodyPr/>
-          <a:lstStyle/>
-          <a:p>
-            <a:r>
-              <a:rPr lang="en-US" dirty="0"/>
-              <a:t>Agenda</a:t>
-            </a:r>
-          </a:p>
-        </p:txBody>
-      </p:sp>
-      <p:sp>
-        <p:nvSpPr>
-          <p:cNvPr id="3" name="Text Placeholder 2"/>
-          <p:cNvSpPr>
-            <a:spLocks noGrp="1"/>
-          </p:cNvSpPr>
-          <p:nvPr>
-            <p:ph type="body" idx="1"/>
-          </p:nvPr>
-        </p:nvSpPr>
-        <p:spPr/>
-        <p:txBody>
-          <a:bodyPr vert="horz" lIns="34289" tIns="34290" rIns="34289" bIns="34290" rtlCol="0" anchor="t">
-            <a:normAutofit/>
-          </a:bodyPr>
-          <a:lstStyle/>
-          <a:p>
-            <a:r>
-              <a:rPr lang="en-US" dirty="0"/>
-              <a:t>Instructor intro</a:t>
-            </a:r>
-          </a:p>
-          <a:p>
-            <a:r>
-              <a:rPr lang="en-US" dirty="0"/>
-              <a:t>Critical links</a:t>
-            </a:r>
-          </a:p>
-          <a:p>
-            <a:r>
-              <a:rPr lang="en-US" dirty="0"/>
-              <a:t>We write some java code</a:t>
-            </a:r>
-          </a:p>
-          <a:p>
-            <a:pPr marL="587693" lvl="1" indent="-244793"/>
-            <a:r>
-              <a:rPr lang="en-US" dirty="0"/>
-              <a:t>Conditionals</a:t>
-            </a:r>
-          </a:p>
-          <a:p>
-            <a:pPr marL="587693" lvl="1" indent="-244793"/>
-            <a:r>
-              <a:rPr lang="en-US" dirty="0"/>
-              <a:t>Strings</a:t>
-            </a:r>
-          </a:p>
-          <a:p>
-            <a:pPr marL="587693" lvl="1" indent="-244793"/>
-            <a:r>
-              <a:rPr lang="en-US" dirty="0"/>
-              <a:t>Loops</a:t>
-            </a:r>
-          </a:p>
-          <a:p>
-            <a:endParaRPr lang="en-US" dirty="0"/>
+          <a:lstStyle>
+            <a:lvl1pPr algn="l" defTabSz="914400" rtl="0" eaLnBrk="1" latinLnBrk="0" hangingPunct="1">
+              <a:lnSpc>
+                <a:spcPct val="90000"/>
+              </a:lnSpc>
+              <a:spcBef>
+                <a:spcPct val="0"/>
+              </a:spcBef>
+              <a:buNone/>
+              <a:defRPr sz="4400" kern="1200">
+                <a:solidFill>
+                  <a:schemeClr val="tx1"/>
+                </a:solidFill>
+                <a:latin typeface="+mj-lt"/>
+                <a:ea typeface="+mj-ea"/>
+                <a:cs typeface="+mj-cs"/>
+              </a:defRPr>
+            </a:lvl1pPr>
+          </a:lstStyle>
+          <a:p>
+            <a:r>
+              <a:rPr lang="en-US" dirty="0"/>
+              <a:t>How we visualize learning has changed over time</a:t>
+            </a:r>
           </a:p>
         </p:txBody>
       </p:sp>
     </p:spTree>
     <p:extLst>
       <p:ext uri="{BB962C8B-B14F-4D97-AF65-F5344CB8AC3E}">
-        <p14:creationId xmlns:p14="http://schemas.microsoft.com/office/powerpoint/2010/main" val="3228078981"/>
+        <p14:creationId xmlns:p14="http://schemas.microsoft.com/office/powerpoint/2010/main" val="3952179403"/>
       </p:ext>
     </p:extLst>
   </p:cSld>
   <p:clrMapOvr>
     <a:masterClrMapping/>
   </p:clrMapOvr>
+  <p:timing>
+    <p:tnLst>
+      <p:par>
+        <p:cTn id="1" dur="indefinite" restart="never" nodeType="tmRoot">
+          <p:childTnLst>
+            <p:seq concurrent="1" nextAc="seek">
+              <p:cTn id="2" dur="indefinite" nodeType="mainSeq">
+                <p:childTnLst>
+                  <p:par>
+                    <p:cTn id="3" fill="hold">
+                      <p:stCondLst>
+                        <p:cond delay="indefinite"/>
+                      </p:stCondLst>
+                      <p:childTnLst>
+                        <p:par>
+                          <p:cTn id="4" fill="hold">
+                            <p:stCondLst>
+                              <p:cond delay="0"/>
+                            </p:stCondLst>
+                            <p:childTnLst>
+                              <p:par>
+                                <p:cTn id="5" presetID="1" presetClass="entr" presetSubtype="0" fill="hold" nodeType="clickEffect">
+                                  <p:stCondLst>
+                                    <p:cond delay="0"/>
+                                  </p:stCondLst>
+                                  <p:childTnLst>
+                                    <p:set>
+                                      <p:cBhvr>
+                                        <p:cTn id="6" dur="1" fill="hold">
+                                          <p:stCondLst>
+                                            <p:cond delay="0"/>
+                                          </p:stCondLst>
+                                        </p:cTn>
+                                        <p:tgtEl>
+                                          <p:spTgt spid="2"/>
+                                        </p:tgtEl>
+                                        <p:attrNameLst>
+                                          <p:attrName>style.visibility</p:attrName>
+                                        </p:attrNameLst>
+                                      </p:cBhvr>
+                                      <p:to>
+                                        <p:strVal val="visible"/>
+                                      </p:to>
+                                    </p:set>
+                                  </p:childTnLst>
+                                </p:cTn>
+                              </p:par>
+                            </p:childTnLst>
+                          </p:cTn>
+                        </p:par>
+                      </p:childTnLst>
+                    </p:cTn>
+                  </p:par>
+                  <p:par>
+                    <p:cTn id="7" fill="hold">
+                      <p:stCondLst>
+                        <p:cond delay="indefinite"/>
+                      </p:stCondLst>
+                      <p:childTnLst>
+                        <p:par>
+                          <p:cTn id="8" fill="hold">
+                            <p:stCondLst>
+                              <p:cond delay="0"/>
+                            </p:stCondLst>
+                            <p:childTnLst>
+                              <p:par>
+                                <p:cTn id="9" presetID="1" presetClass="entr" presetSubtype="0" fill="hold" nodeType="clickEffect">
+                                  <p:stCondLst>
+                                    <p:cond delay="0"/>
+                                  </p:stCondLst>
+                                  <p:childTnLst>
+                                    <p:set>
+                                      <p:cBhvr>
+                                        <p:cTn id="10" dur="1" fill="hold">
+                                          <p:stCondLst>
+                                            <p:cond delay="0"/>
+                                          </p:stCondLst>
+                                        </p:cTn>
+                                        <p:tgtEl>
+                                          <p:spTgt spid="3"/>
+                                        </p:tgtEl>
+                                        <p:attrNameLst>
+                                          <p:attrName>style.visibility</p:attrName>
+                                        </p:attrNameLst>
+                                      </p:cBhvr>
+                                      <p:to>
+                                        <p:strVal val="visible"/>
+                                      </p:to>
+                                    </p:set>
+                                  </p:childTnLst>
+                                </p:cTn>
+                              </p:par>
+                            </p:childTnLst>
+                          </p:cTn>
+                        </p:par>
+                      </p:childTnLst>
+                    </p:cTn>
+                  </p:par>
+                </p:childTnLst>
+              </p:cTn>
+              <p:prevCondLst>
+                <p:cond evt="onPrev" delay="0">
+                  <p:tgtEl>
+                    <p:sldTgt/>
+                  </p:tgtEl>
+                </p:cond>
+              </p:prevCondLst>
+              <p:nextCondLst>
+                <p:cond evt="onNext" delay="0">
+                  <p:tgtEl>
+                    <p:sldTgt/>
+                  </p:tgtEl>
+                </p:cond>
+              </p:nextCondLst>
+            </p:seq>
+          </p:childTnLst>
+        </p:cTn>
+      </p:par>
+    </p:tnLst>
+  </p:timing>
 </p:sld>
 </file>
 
@@ -7877,6 +8919,118 @@
           <a:p>
             <a:r>
               <a:rPr lang="en-US" dirty="0"/>
+              <a:t>Agenda</a:t>
+            </a:r>
+          </a:p>
+        </p:txBody>
+      </p:sp>
+      <p:sp>
+        <p:nvSpPr>
+          <p:cNvPr id="3" name="Text Placeholder 2"/>
+          <p:cNvSpPr>
+            <a:spLocks noGrp="1"/>
+          </p:cNvSpPr>
+          <p:nvPr>
+            <p:ph type="body" idx="1"/>
+          </p:nvPr>
+        </p:nvSpPr>
+        <p:spPr/>
+        <p:txBody>
+          <a:bodyPr vert="horz" lIns="34289" tIns="34290" rIns="34289" bIns="34290" rtlCol="0" anchor="t">
+            <a:normAutofit/>
+          </a:bodyPr>
+          <a:lstStyle/>
+          <a:p>
+            <a:r>
+              <a:rPr lang="en-US" dirty="0"/>
+              <a:t>Instructor intro</a:t>
+            </a:r>
+          </a:p>
+          <a:p>
+            <a:r>
+              <a:rPr lang="en-US" dirty="0"/>
+              <a:t>Critical logistics</a:t>
+            </a:r>
+          </a:p>
+          <a:p>
+            <a:r>
+              <a:rPr lang="en-US" dirty="0"/>
+              <a:t>We write some java code</a:t>
+            </a:r>
+          </a:p>
+          <a:p>
+            <a:pPr marL="587693" lvl="1" indent="-244793"/>
+            <a:r>
+              <a:rPr lang="en-US" dirty="0"/>
+              <a:t>Conditionals</a:t>
+            </a:r>
+          </a:p>
+          <a:p>
+            <a:pPr marL="587693" lvl="1" indent="-244793"/>
+            <a:r>
+              <a:rPr lang="en-US" dirty="0"/>
+              <a:t>Strings</a:t>
+            </a:r>
+          </a:p>
+          <a:p>
+            <a:pPr marL="587693" lvl="1" indent="-244793"/>
+            <a:r>
+              <a:rPr lang="en-US" dirty="0"/>
+              <a:t>Loops</a:t>
+            </a:r>
+          </a:p>
+          <a:p>
+            <a:endParaRPr lang="en-US" dirty="0"/>
+          </a:p>
+        </p:txBody>
+      </p:sp>
+    </p:spTree>
+    <p:extLst>
+      <p:ext uri="{BB962C8B-B14F-4D97-AF65-F5344CB8AC3E}">
+        <p14:creationId xmlns:p14="http://schemas.microsoft.com/office/powerpoint/2010/main" val="3228078981"/>
+      </p:ext>
+    </p:extLst>
+  </p:cSld>
+  <p:clrMapOvr>
+    <a:masterClrMapping/>
+  </p:clrMapOvr>
+</p:sld>
+</file>
+
+<file path=ppt/slides/slide6.xml><?xml version="1.0" encoding="utf-8"?>
+<p:sld xmlns:a="http://schemas.openxmlformats.org/drawingml/2006/main" xmlns:r="http://schemas.openxmlformats.org/officeDocument/2006/relationships" xmlns:p="http://schemas.openxmlformats.org/presentationml/2006/main" show="0">
+  <p:cSld>
+    <p:spTree>
+      <p:nvGrpSpPr>
+        <p:cNvPr id="1" name=""/>
+        <p:cNvGrpSpPr/>
+        <p:nvPr/>
+      </p:nvGrpSpPr>
+      <p:grpSpPr>
+        <a:xfrm>
+          <a:off x="0" y="0"/>
+          <a:ext cx="0" cy="0"/>
+          <a:chOff x="0" y="0"/>
+          <a:chExt cx="0" cy="0"/>
+        </a:xfrm>
+      </p:grpSpPr>
+      <p:sp>
+        <p:nvSpPr>
+          <p:cNvPr id="2" name="Title 1"/>
+          <p:cNvSpPr>
+            <a:spLocks noGrp="1"/>
+          </p:cNvSpPr>
+          <p:nvPr>
+            <p:ph type="title"/>
+          </p:nvPr>
+        </p:nvSpPr>
+        <p:spPr/>
+        <p:txBody>
+          <a:bodyPr/>
+          <a:lstStyle/>
+          <a:p>
+            <a:r>
+              <a:rPr lang="en-US" dirty="0"/>
               <a:t>Instructor Info</a:t>
             </a:r>
           </a:p>
@@ -7973,8 +9127,8 @@
 </p:sld>
 </file>
 
-<file path=ppt/slides/slide6.xml><?xml version="1.0" encoding="utf-8"?>
-<p:sld xmlns:a="http://schemas.openxmlformats.org/drawingml/2006/main" xmlns:r="http://schemas.openxmlformats.org/officeDocument/2006/relationships" xmlns:p="http://schemas.openxmlformats.org/presentationml/2006/main">
+<file path=ppt/slides/slide7.xml><?xml version="1.0" encoding="utf-8"?>
+<p:sld xmlns:a="http://schemas.openxmlformats.org/drawingml/2006/main" xmlns:r="http://schemas.openxmlformats.org/officeDocument/2006/relationships" xmlns:p="http://schemas.openxmlformats.org/presentationml/2006/main" show="0">
   <p:cSld>
     <p:spTree>
       <p:nvGrpSpPr>
@@ -8119,8 +9273,8 @@
 </p:sld>
 </file>
 
-<file path=ppt/slides/slide7.xml><?xml version="1.0" encoding="utf-8"?>
-<p:sld xmlns:a="http://schemas.openxmlformats.org/drawingml/2006/main" xmlns:r="http://schemas.openxmlformats.org/officeDocument/2006/relationships" xmlns:p="http://schemas.openxmlformats.org/presentationml/2006/main">
+<file path=ppt/slides/slide8.xml><?xml version="1.0" encoding="utf-8"?>
+<p:sld xmlns:a="http://schemas.openxmlformats.org/drawingml/2006/main" xmlns:r="http://schemas.openxmlformats.org/officeDocument/2006/relationships" xmlns:p="http://schemas.openxmlformats.org/presentationml/2006/main" show="0">
   <p:cSld>
     <p:spTree>
       <p:nvGrpSpPr>
@@ -8261,117 +9415,6 @@
     <p:extLst>
       <p:ext uri="{BB962C8B-B14F-4D97-AF65-F5344CB8AC3E}">
         <p14:creationId xmlns:p14="http://schemas.microsoft.com/office/powerpoint/2010/main" val="2647588529"/>
-      </p:ext>
-    </p:extLst>
-  </p:cSld>
-  <p:clrMapOvr>
-    <a:masterClrMapping/>
-  </p:clrMapOvr>
-</p:sld>
-</file>
-
-<file path=ppt/slides/slide8.xml><?xml version="1.0" encoding="utf-8"?>
-<p:sld xmlns:a="http://schemas.openxmlformats.org/drawingml/2006/main" xmlns:r="http://schemas.openxmlformats.org/officeDocument/2006/relationships" xmlns:p="http://schemas.openxmlformats.org/presentationml/2006/main">
-  <p:cSld>
-    <p:spTree>
-      <p:nvGrpSpPr>
-        <p:cNvPr id="1" name=""/>
-        <p:cNvGrpSpPr/>
-        <p:nvPr/>
-      </p:nvGrpSpPr>
-      <p:grpSpPr>
-        <a:xfrm>
-          <a:off x="0" y="0"/>
-          <a:ext cx="0" cy="0"/>
-          <a:chOff x="0" y="0"/>
-          <a:chExt cx="0" cy="0"/>
-        </a:xfrm>
-      </p:grpSpPr>
-      <p:sp>
-        <p:nvSpPr>
-          <p:cNvPr id="2" name="Title 1"/>
-          <p:cNvSpPr>
-            <a:spLocks noGrp="1"/>
-          </p:cNvSpPr>
-          <p:nvPr>
-            <p:ph type="title"/>
-          </p:nvPr>
-        </p:nvSpPr>
-        <p:spPr/>
-        <p:txBody>
-          <a:bodyPr/>
-          <a:lstStyle/>
-          <a:p>
-            <a:r>
-              <a:rPr lang="en-US" dirty="0"/>
-              <a:t>Introductions</a:t>
-            </a:r>
-          </a:p>
-        </p:txBody>
-      </p:sp>
-      <p:sp>
-        <p:nvSpPr>
-          <p:cNvPr id="3" name="Text Placeholder 2"/>
-          <p:cNvSpPr>
-            <a:spLocks noGrp="1"/>
-          </p:cNvSpPr>
-          <p:nvPr>
-            <p:ph type="body" idx="1"/>
-          </p:nvPr>
-        </p:nvSpPr>
-        <p:spPr>
-          <a:xfrm>
-            <a:off x="1634971" y="1675152"/>
-            <a:ext cx="8229600" cy="2819400"/>
-          </a:xfrm>
-        </p:spPr>
-        <p:txBody>
-          <a:bodyPr>
-            <a:normAutofit/>
-          </a:bodyPr>
-          <a:lstStyle/>
-          <a:p>
-            <a:r>
-              <a:rPr lang="en-US" sz="3600" dirty="0"/>
-              <a:t>TA</a:t>
-            </a:r>
-          </a:p>
-          <a:p>
-            <a:r>
-              <a:rPr lang="en-US" sz="3600" dirty="0"/>
-              <a:t>Students (briefly! </a:t>
-            </a:r>
-            <a:r>
-              <a:rPr lang="en-US" sz="3600" dirty="0">
-                <a:sym typeface="Wingdings" panose="05000000000000000000" pitchFamily="2" charset="2"/>
-              </a:rPr>
-              <a:t> it’s a big class</a:t>
-            </a:r>
-            <a:r>
-              <a:rPr lang="en-US" sz="3600" dirty="0"/>
-              <a:t>)</a:t>
-            </a:r>
-          </a:p>
-          <a:p>
-            <a:pPr lvl="1"/>
-            <a:r>
-              <a:rPr lang="en-US" sz="3200" dirty="0"/>
-              <a:t>What should we call you?</a:t>
-            </a:r>
-          </a:p>
-          <a:p>
-            <a:pPr lvl="1"/>
-            <a:r>
-              <a:rPr lang="en-US" sz="3200" dirty="0"/>
-              <a:t>What you do for fun/rejuvenation?</a:t>
-            </a:r>
-          </a:p>
-        </p:txBody>
-      </p:sp>
-    </p:spTree>
-    <p:extLst>
-      <p:ext uri="{BB962C8B-B14F-4D97-AF65-F5344CB8AC3E}">
-        <p14:creationId xmlns:p14="http://schemas.microsoft.com/office/powerpoint/2010/main" val="1613605203"/>
       </p:ext>
     </p:extLst>
   </p:cSld>
@@ -8432,88 +9475,119 @@
         </p:nvSpPr>
         <p:spPr>
           <a:xfrm>
-            <a:off x="1981200" y="1371600"/>
-            <a:ext cx="8229600" cy="5486400"/>
+            <a:off x="1485900" y="1538736"/>
+            <a:ext cx="9220200" cy="4721225"/>
           </a:xfrm>
         </p:spPr>
         <p:txBody>
-          <a:bodyPr/>
-          <a:lstStyle/>
-          <a:p>
-            <a:r>
-              <a:rPr lang="en-US" dirty="0"/>
-              <a:t>Amanda Stouder</a:t>
-            </a:r>
-          </a:p>
-          <a:p>
-            <a:pPr lvl="1"/>
-            <a:r>
-              <a:rPr lang="en-US" dirty="0"/>
-              <a:t>Assistant Professor for the Practice of Computer Science and Software Engineering</a:t>
-            </a:r>
-          </a:p>
-          <a:p>
-            <a:pPr lvl="1"/>
-            <a:r>
-              <a:rPr lang="en-US" dirty="0"/>
-              <a:t>You can call me:</a:t>
-            </a:r>
-          </a:p>
-          <a:p>
-            <a:pPr lvl="2"/>
-            <a:r>
-              <a:rPr lang="en-US" dirty="0"/>
-              <a:t>Amanda</a:t>
-            </a:r>
-          </a:p>
-          <a:p>
-            <a:pPr lvl="2"/>
-            <a:r>
-              <a:rPr lang="en-US" dirty="0"/>
-              <a:t>Professor Stouder</a:t>
-            </a:r>
-          </a:p>
-          <a:p>
-            <a:pPr lvl="1"/>
-            <a:r>
-              <a:rPr lang="en-US" dirty="0"/>
-              <a:t>Don’t call me:</a:t>
-            </a:r>
-          </a:p>
-          <a:p>
-            <a:pPr lvl="2"/>
-            <a:r>
-              <a:rPr lang="en-US" strike="sngStrike" dirty="0"/>
-              <a:t>Mrs. Stouder</a:t>
-            </a:r>
-            <a:r>
-              <a:rPr lang="en-US" dirty="0"/>
-              <a:t> (please not this)</a:t>
-            </a:r>
-          </a:p>
-          <a:p>
-            <a:pPr lvl="2"/>
-            <a:r>
-              <a:rPr lang="en-US" strike="sngStrike" dirty="0"/>
-              <a:t>Dr. Stouder</a:t>
-            </a:r>
-            <a:r>
-              <a:rPr lang="en-US" dirty="0"/>
-              <a:t> (not this either, I’ll explain)</a:t>
-            </a:r>
-          </a:p>
+          <a:bodyPr>
+            <a:normAutofit/>
+          </a:bodyPr>
+          <a:lstStyle/>
           <a:p>
             <a:pPr marL="0" indent="0">
               <a:buNone/>
             </a:pPr>
+            <a:r>
+              <a:rPr lang="en-US" dirty="0"/>
+              <a:t>Ian Ludden</a:t>
+            </a:r>
+          </a:p>
+          <a:p>
+            <a:r>
+              <a:rPr lang="en-US" dirty="0"/>
+              <a:t>Feel free to call me:</a:t>
+            </a:r>
+          </a:p>
+          <a:p>
+            <a:pPr lvl="1"/>
+            <a:r>
+              <a:rPr lang="en-US" dirty="0"/>
+              <a:t>Ian, Professor Ludden, or Professor Ian</a:t>
+            </a:r>
+          </a:p>
+          <a:p>
+            <a:pPr lvl="1"/>
+            <a:r>
+              <a:rPr lang="en-US" dirty="0"/>
+              <a:t>If you call me just “professor”, I may call you just “student” </a:t>
+            </a:r>
+            <a:r>
+              <a:rPr lang="en-US" dirty="0">
+                <a:sym typeface="Wingdings" panose="05000000000000000000" pitchFamily="2" charset="2"/>
+              </a:rPr>
+              <a:t></a:t>
+            </a:r>
             <a:endParaRPr lang="en-US" dirty="0"/>
+          </a:p>
+          <a:p>
+            <a:r>
+              <a:rPr lang="en-US" dirty="0"/>
+              <a:t>B.S. in CPE/MA from Rose-Hulman, Fall 2016</a:t>
+            </a:r>
+          </a:p>
+          <a:p>
+            <a:r>
+              <a:rPr lang="en-US" dirty="0"/>
+              <a:t>Ph.D. in CS from the University of Illinois Urbana-Champaign</a:t>
+            </a:r>
+          </a:p>
+          <a:p>
+            <a:r>
+              <a:rPr lang="en-US" dirty="0"/>
+              <a:t>Originally from Tampa, Florida (the Midwest is better)</a:t>
+            </a:r>
+          </a:p>
+          <a:p>
+            <a:r>
+              <a:rPr lang="en-US" dirty="0"/>
+              <a:t>Industry experience: </a:t>
+            </a:r>
+            <a:r>
+              <a:rPr lang="en-US" dirty="0" err="1"/>
+              <a:t>FitzMark</a:t>
+            </a:r>
+            <a:r>
+              <a:rPr lang="en-US" dirty="0"/>
+              <a:t> (Indy), Garmin (KC), </a:t>
+            </a:r>
+            <a:br>
+              <a:rPr lang="en-US" dirty="0"/>
+            </a:br>
+            <a:r>
+              <a:rPr lang="en-US" dirty="0"/>
+              <a:t>LGS (Tampa), </a:t>
+            </a:r>
+            <a:r>
+              <a:rPr lang="en-US" dirty="0" err="1"/>
+              <a:t>PilotFish</a:t>
+            </a:r>
+            <a:r>
+              <a:rPr lang="en-US" dirty="0"/>
+              <a:t> (Tampa)</a:t>
+            </a:r>
+          </a:p>
+          <a:p>
+            <a:pPr lvl="1"/>
+            <a:r>
+              <a:rPr lang="en-US" dirty="0"/>
+              <a:t>Wrote lots of Java code at </a:t>
+            </a:r>
+            <a:r>
+              <a:rPr lang="en-US" dirty="0" err="1"/>
+              <a:t>PilotFish</a:t>
+            </a:r>
+            <a:r>
+              <a:rPr lang="en-US" dirty="0"/>
+              <a:t>! </a:t>
+            </a:r>
           </a:p>
         </p:txBody>
       </p:sp>
     </p:spTree>
     <p:extLst>
       <p:ext uri="{BB962C8B-B14F-4D97-AF65-F5344CB8AC3E}">
-        <p14:creationId xmlns:p14="http://schemas.microsoft.com/office/powerpoint/2010/main" val="4221316393"/>
+        <p14:creationId xmlns:p14="http://schemas.microsoft.com/office/powerpoint/2010/main" val="302694256"/>
       </p:ext>
     </p:extLst>
   </p:cSld>

</xml_diff>